<commit_message>
Update 0424 project05 - 파워포인트 - 서희.pptx
</commit_message>
<xml_diff>
--- a/0 발표용 파워포인트/0424 4차발표/0424 project05 - 파워포인트 - 서희.pptx
+++ b/0 발표용 파워포인트/0424 4차발표/0424 project05 - 파워포인트 - 서희.pptx
@@ -5,7 +5,7 @@
     <p:sldMasterId id="2147483648" r:id="rId1"/>
   </p:sldMasterIdLst>
   <p:notesMasterIdLst>
-    <p:notesMasterId r:id="rId24"/>
+    <p:notesMasterId r:id="rId20"/>
   </p:notesMasterIdLst>
   <p:sldIdLst>
     <p:sldId id="256" r:id="rId2"/>
@@ -23,13 +23,9 @@
     <p:sldId id="295" r:id="rId14"/>
     <p:sldId id="305" r:id="rId15"/>
     <p:sldId id="265" r:id="rId16"/>
-    <p:sldId id="266" r:id="rId17"/>
-    <p:sldId id="267" r:id="rId18"/>
-    <p:sldId id="307" r:id="rId19"/>
-    <p:sldId id="278" r:id="rId20"/>
-    <p:sldId id="279" r:id="rId21"/>
-    <p:sldId id="280" r:id="rId22"/>
-    <p:sldId id="306" r:id="rId23"/>
+    <p:sldId id="307" r:id="rId17"/>
+    <p:sldId id="278" r:id="rId18"/>
+    <p:sldId id="306" r:id="rId19"/>
   </p:sldIdLst>
   <p:sldSz cx="12192000" cy="6858000"/>
   <p:notesSz cx="6858000" cy="9144000"/>
@@ -160,23 +156,19 @@
         <p14:section name="[모바일] 세미나 상세페이지" id="{CE312896-E1D8-4F1D-B918-334370D7F0C8}">
           <p14:sldIdLst>
             <p14:sldId id="265"/>
-            <p14:sldId id="266"/>
-            <p14:sldId id="267"/>
             <p14:sldId id="307"/>
           </p14:sldIdLst>
         </p14:section>
         <p14:section name="[모바일] 세미나 결제 페이지" id="{D601EC8E-CCCC-4F93-A98B-0EAEB297933F}">
           <p14:sldIdLst>
             <p14:sldId id="278"/>
-            <p14:sldId id="279"/>
-            <p14:sldId id="280"/>
             <p14:sldId id="306"/>
           </p14:sldIdLst>
         </p14:section>
       </p14:sectionLst>
     </p:ext>
     <p:ext uri="{EFAFB233-063F-42B5-8137-9DF3F51BA10A}">
-      <p15:sldGuideLst xmlns="" xmlns:p15="http://schemas.microsoft.com/office/powerpoint/2012/main">
+      <p15:sldGuideLst xmlns:p15="http://schemas.microsoft.com/office/powerpoint/2012/main" xmlns="">
         <p15:guide id="1" orient="horz" pos="2160">
           <p15:clr>
             <a:srgbClr val="A4A3A4"/>
@@ -190,7 +182,7 @@
       </p15:sldGuideLst>
     </p:ext>
     <p:ext uri="{2D200454-40CA-4A62-9FC3-DE9A4176ACB9}">
-      <p15:notesGuideLst xmlns="" xmlns:p15="http://schemas.microsoft.com/office/powerpoint/2012/main"/>
+      <p15:notesGuideLst xmlns:p15="http://schemas.microsoft.com/office/powerpoint/2012/main" xmlns=""/>
     </p:ext>
   </p:extLst>
 </p:presentation>
@@ -3588,7 +3580,7 @@
                 <a:gridCol w="8032096">
                   <a:extLst>
                     <a:ext uri="{9D8B030D-6E8A-4147-A177-3AD203B41FA5}">
-                      <a16:colId xmlns="" xmlns:a16="http://schemas.microsoft.com/office/drawing/2014/main" val="20000"/>
+                      <a16:colId xmlns:a16="http://schemas.microsoft.com/office/drawing/2014/main" xmlns="" val="20000"/>
                     </a:ext>
                   </a:extLst>
                 </a:gridCol>
@@ -3653,7 +3645,7 @@
                 </a:tc>
                 <a:extLst>
                   <a:ext uri="{0D108BD9-81ED-4DB2-BD59-A6C34878D82A}">
-                    <a16:rowId xmlns="" xmlns:a16="http://schemas.microsoft.com/office/drawing/2014/main" val="10000"/>
+                    <a16:rowId xmlns:a16="http://schemas.microsoft.com/office/drawing/2014/main" xmlns="" val="10000"/>
                   </a:ext>
                 </a:extLst>
               </a:tr>
@@ -3717,7 +3709,7 @@
                 </a:tc>
                 <a:extLst>
                   <a:ext uri="{0D108BD9-81ED-4DB2-BD59-A6C34878D82A}">
-                    <a16:rowId xmlns="" xmlns:a16="http://schemas.microsoft.com/office/drawing/2014/main" val="10001"/>
+                    <a16:rowId xmlns:a16="http://schemas.microsoft.com/office/drawing/2014/main" xmlns="" val="10001"/>
                   </a:ext>
                 </a:extLst>
               </a:tr>
@@ -3981,14 +3973,14 @@
                 <a:gridCol w="342705">
                   <a:extLst>
                     <a:ext uri="{9D8B030D-6E8A-4147-A177-3AD203B41FA5}">
-                      <a16:colId xmlns="" xmlns:a16="http://schemas.microsoft.com/office/drawing/2014/main" val="20000"/>
+                      <a16:colId xmlns:a16="http://schemas.microsoft.com/office/drawing/2014/main" xmlns="" val="20000"/>
                     </a:ext>
                   </a:extLst>
                 </a:gridCol>
                 <a:gridCol w="3149108">
                   <a:extLst>
                     <a:ext uri="{9D8B030D-6E8A-4147-A177-3AD203B41FA5}">
-                      <a16:colId xmlns="" xmlns:a16="http://schemas.microsoft.com/office/drawing/2014/main" val="20001"/>
+                      <a16:colId xmlns:a16="http://schemas.microsoft.com/office/drawing/2014/main" xmlns="" val="20001"/>
                     </a:ext>
                   </a:extLst>
                 </a:gridCol>
@@ -4085,7 +4077,7 @@
                 </a:tc>
                 <a:extLst>
                   <a:ext uri="{0D108BD9-81ED-4DB2-BD59-A6C34878D82A}">
-                    <a16:rowId xmlns="" xmlns:a16="http://schemas.microsoft.com/office/drawing/2014/main" val="10000"/>
+                    <a16:rowId xmlns:a16="http://schemas.microsoft.com/office/drawing/2014/main" xmlns="" val="10000"/>
                   </a:ext>
                 </a:extLst>
               </a:tr>
@@ -4194,7 +4186,7 @@
                 </a:tc>
                 <a:extLst>
                   <a:ext uri="{0D108BD9-81ED-4DB2-BD59-A6C34878D82A}">
-                    <a16:rowId xmlns="" xmlns:a16="http://schemas.microsoft.com/office/drawing/2014/main" val="10001"/>
+                    <a16:rowId xmlns:a16="http://schemas.microsoft.com/office/drawing/2014/main" xmlns="" val="10001"/>
                   </a:ext>
                 </a:extLst>
               </a:tr>
@@ -4334,7 +4326,7 @@
                 </a:tc>
                 <a:extLst>
                   <a:ext uri="{0D108BD9-81ED-4DB2-BD59-A6C34878D82A}">
-                    <a16:rowId xmlns="" xmlns:a16="http://schemas.microsoft.com/office/drawing/2014/main" val="10002"/>
+                    <a16:rowId xmlns:a16="http://schemas.microsoft.com/office/drawing/2014/main" xmlns="" val="10002"/>
                   </a:ext>
                 </a:extLst>
               </a:tr>
@@ -6811,14 +6803,14 @@
                 <a:gridCol w="342705">
                   <a:extLst>
                     <a:ext uri="{9D8B030D-6E8A-4147-A177-3AD203B41FA5}">
-                      <a16:colId xmlns="" xmlns:a16="http://schemas.microsoft.com/office/drawing/2014/main" val="20000"/>
+                      <a16:colId xmlns:a16="http://schemas.microsoft.com/office/drawing/2014/main" xmlns="" val="20000"/>
                     </a:ext>
                   </a:extLst>
                 </a:gridCol>
                 <a:gridCol w="3149108">
                   <a:extLst>
                     <a:ext uri="{9D8B030D-6E8A-4147-A177-3AD203B41FA5}">
-                      <a16:colId xmlns="" xmlns:a16="http://schemas.microsoft.com/office/drawing/2014/main" val="20001"/>
+                      <a16:colId xmlns:a16="http://schemas.microsoft.com/office/drawing/2014/main" xmlns="" val="20001"/>
                     </a:ext>
                   </a:extLst>
                 </a:gridCol>
@@ -6914,7 +6906,7 @@
                 </a:tc>
                 <a:extLst>
                   <a:ext uri="{0D108BD9-81ED-4DB2-BD59-A6C34878D82A}">
-                    <a16:rowId xmlns="" xmlns:a16="http://schemas.microsoft.com/office/drawing/2014/main" val="10000"/>
+                    <a16:rowId xmlns:a16="http://schemas.microsoft.com/office/drawing/2014/main" xmlns="" val="10000"/>
                   </a:ext>
                 </a:extLst>
               </a:tr>
@@ -7022,7 +7014,7 @@
                 </a:tc>
                 <a:extLst>
                   <a:ext uri="{0D108BD9-81ED-4DB2-BD59-A6C34878D82A}">
-                    <a16:rowId xmlns="" xmlns:a16="http://schemas.microsoft.com/office/drawing/2014/main" val="10001"/>
+                    <a16:rowId xmlns:a16="http://schemas.microsoft.com/office/drawing/2014/main" xmlns="" val="10001"/>
                   </a:ext>
                 </a:extLst>
               </a:tr>
@@ -7054,7 +7046,7 @@
                 <a:gridCol w="8032096">
                   <a:extLst>
                     <a:ext uri="{9D8B030D-6E8A-4147-A177-3AD203B41FA5}">
-                      <a16:colId xmlns="" xmlns:a16="http://schemas.microsoft.com/office/drawing/2014/main" val="20000"/>
+                      <a16:colId xmlns:a16="http://schemas.microsoft.com/office/drawing/2014/main" xmlns="" val="20000"/>
                     </a:ext>
                   </a:extLst>
                 </a:gridCol>
@@ -7119,7 +7111,7 @@
                 </a:tc>
                 <a:extLst>
                   <a:ext uri="{0D108BD9-81ED-4DB2-BD59-A6C34878D82A}">
-                    <a16:rowId xmlns="" xmlns:a16="http://schemas.microsoft.com/office/drawing/2014/main" val="10000"/>
+                    <a16:rowId xmlns:a16="http://schemas.microsoft.com/office/drawing/2014/main" xmlns="" val="10000"/>
                   </a:ext>
                 </a:extLst>
               </a:tr>
@@ -7183,7 +7175,7 @@
                 </a:tc>
                 <a:extLst>
                   <a:ext uri="{0D108BD9-81ED-4DB2-BD59-A6C34878D82A}">
-                    <a16:rowId xmlns="" xmlns:a16="http://schemas.microsoft.com/office/drawing/2014/main" val="10001"/>
+                    <a16:rowId xmlns:a16="http://schemas.microsoft.com/office/drawing/2014/main" xmlns="" val="10001"/>
                   </a:ext>
                 </a:extLst>
               </a:tr>
@@ -7345,7 +7337,7 @@
                 <a:gridCol w="5556421">
                   <a:extLst>
                     <a:ext uri="{9D8B030D-6E8A-4147-A177-3AD203B41FA5}">
-                      <a16:colId xmlns="" xmlns:a16="http://schemas.microsoft.com/office/drawing/2014/main" val="20000"/>
+                      <a16:colId xmlns:a16="http://schemas.microsoft.com/office/drawing/2014/main" xmlns="" val="20000"/>
                     </a:ext>
                   </a:extLst>
                 </a:gridCol>
@@ -7496,7 +7488,7 @@
                 </a:tc>
                 <a:extLst>
                   <a:ext uri="{0D108BD9-81ED-4DB2-BD59-A6C34878D82A}">
-                    <a16:rowId xmlns="" xmlns:a16="http://schemas.microsoft.com/office/drawing/2014/main" val="10000"/>
+                    <a16:rowId xmlns:a16="http://schemas.microsoft.com/office/drawing/2014/main" xmlns="" val="10000"/>
                   </a:ext>
                 </a:extLst>
               </a:tr>
@@ -7532,14 +7524,14 @@
                 <a:gridCol w="904763">
                   <a:extLst>
                     <a:ext uri="{9D8B030D-6E8A-4147-A177-3AD203B41FA5}">
-                      <a16:colId xmlns="" xmlns:a16="http://schemas.microsoft.com/office/drawing/2014/main" val="20000"/>
+                      <a16:colId xmlns:a16="http://schemas.microsoft.com/office/drawing/2014/main" xmlns="" val="20000"/>
                     </a:ext>
                   </a:extLst>
                 </a:gridCol>
                 <a:gridCol w="3196281">
                   <a:extLst>
                     <a:ext uri="{9D8B030D-6E8A-4147-A177-3AD203B41FA5}">
-                      <a16:colId xmlns="" xmlns:a16="http://schemas.microsoft.com/office/drawing/2014/main" val="20001"/>
+                      <a16:colId xmlns:a16="http://schemas.microsoft.com/office/drawing/2014/main" xmlns="" val="20001"/>
                     </a:ext>
                   </a:extLst>
                 </a:gridCol>
@@ -7686,7 +7678,7 @@
                 </a:tc>
                 <a:extLst>
                   <a:ext uri="{0D108BD9-81ED-4DB2-BD59-A6C34878D82A}">
-                    <a16:rowId xmlns="" xmlns:a16="http://schemas.microsoft.com/office/drawing/2014/main" val="10000"/>
+                    <a16:rowId xmlns:a16="http://schemas.microsoft.com/office/drawing/2014/main" xmlns="" val="10000"/>
                   </a:ext>
                 </a:extLst>
               </a:tr>
@@ -8496,7 +8488,7 @@
                 <a:gridCol w="8032096">
                   <a:extLst>
                     <a:ext uri="{9D8B030D-6E8A-4147-A177-3AD203B41FA5}">
-                      <a16:colId xmlns="" xmlns:a16="http://schemas.microsoft.com/office/drawing/2014/main" val="20000"/>
+                      <a16:colId xmlns:a16="http://schemas.microsoft.com/office/drawing/2014/main" xmlns="" val="20000"/>
                     </a:ext>
                   </a:extLst>
                 </a:gridCol>
@@ -8563,7 +8555,7 @@
                 </a:tc>
                 <a:extLst>
                   <a:ext uri="{0D108BD9-81ED-4DB2-BD59-A6C34878D82A}">
-                    <a16:rowId xmlns="" xmlns:a16="http://schemas.microsoft.com/office/drawing/2014/main" val="10000"/>
+                    <a16:rowId xmlns:a16="http://schemas.microsoft.com/office/drawing/2014/main" xmlns="" val="10000"/>
                   </a:ext>
                 </a:extLst>
               </a:tr>
@@ -8595,14 +8587,14 @@
                 <a:gridCol w="342705">
                   <a:extLst>
                     <a:ext uri="{9D8B030D-6E8A-4147-A177-3AD203B41FA5}">
-                      <a16:colId xmlns="" xmlns:a16="http://schemas.microsoft.com/office/drawing/2014/main" val="20000"/>
+                      <a16:colId xmlns:a16="http://schemas.microsoft.com/office/drawing/2014/main" xmlns="" val="20000"/>
                     </a:ext>
                   </a:extLst>
                 </a:gridCol>
                 <a:gridCol w="3149108">
                   <a:extLst>
                     <a:ext uri="{9D8B030D-6E8A-4147-A177-3AD203B41FA5}">
-                      <a16:colId xmlns="" xmlns:a16="http://schemas.microsoft.com/office/drawing/2014/main" val="20001"/>
+                      <a16:colId xmlns:a16="http://schemas.microsoft.com/office/drawing/2014/main" xmlns="" val="20001"/>
                     </a:ext>
                   </a:extLst>
                 </a:gridCol>
@@ -8698,7 +8690,7 @@
                 </a:tc>
                 <a:extLst>
                   <a:ext uri="{0D108BD9-81ED-4DB2-BD59-A6C34878D82A}">
-                    <a16:rowId xmlns="" xmlns:a16="http://schemas.microsoft.com/office/drawing/2014/main" val="10000"/>
+                    <a16:rowId xmlns:a16="http://schemas.microsoft.com/office/drawing/2014/main" xmlns="" val="10000"/>
                   </a:ext>
                 </a:extLst>
               </a:tr>
@@ -8786,7 +8778,7 @@
                 </a:tc>
                 <a:extLst>
                   <a:ext uri="{0D108BD9-81ED-4DB2-BD59-A6C34878D82A}">
-                    <a16:rowId xmlns="" xmlns:a16="http://schemas.microsoft.com/office/drawing/2014/main" val="10001"/>
+                    <a16:rowId xmlns:a16="http://schemas.microsoft.com/office/drawing/2014/main" xmlns="" val="10001"/>
                   </a:ext>
                 </a:extLst>
               </a:tr>
@@ -9057,7 +9049,7 @@
         <p:spPr>
           <a:xfrm>
             <a:off x="114866" y="241014"/>
-            <a:ext cx="7653057" cy="477054"/>
+            <a:ext cx="7120860" cy="477054"/>
           </a:xfrm>
           <a:prstGeom prst="rect">
             <a:avLst/>
@@ -9161,16 +9153,16 @@
                 </a:solidFill>
                 <a:latin typeface="+mj-lt"/>
               </a:rPr>
-              <a:t>세미나 상세페이지 </a:t>
-            </a:r>
-            <a:r>
-              <a:rPr lang="en-US" altLang="ko-KR" sz="2500" dirty="0" smtClean="0">
+              <a:t>세미나 </a:t>
+            </a:r>
+            <a:r>
+              <a:rPr lang="ko-KR" altLang="en-US" sz="2500" dirty="0" smtClean="0">
                 <a:solidFill>
                   <a:schemeClr val="bg1"/>
                 </a:solidFill>
                 <a:latin typeface="+mj-lt"/>
               </a:rPr>
-              <a:t>- 1</a:t>
+              <a:t>상세페이지</a:t>
             </a:r>
             <a:endParaRPr lang="ko-KR" altLang="en-US" sz="2500" dirty="0">
               <a:solidFill>
@@ -9202,1464 +9194,6 @@
 </file>
 
 <file path=ppt/slides/slide16.xml><?xml version="1.0" encoding="utf-8"?>
-<p:sld xmlns:a="http://schemas.openxmlformats.org/drawingml/2006/main" xmlns:r="http://schemas.openxmlformats.org/officeDocument/2006/relationships" xmlns:p="http://schemas.openxmlformats.org/presentationml/2006/main">
-  <p:cSld>
-    <p:spTree>
-      <p:nvGrpSpPr>
-        <p:cNvPr id="1" name=""/>
-        <p:cNvGrpSpPr/>
-        <p:nvPr/>
-      </p:nvGrpSpPr>
-      <p:grpSpPr>
-        <a:xfrm>
-          <a:off x="0" y="0"/>
-          <a:ext cx="0" cy="0"/>
-          <a:chOff x="0" y="0"/>
-          <a:chExt cx="0" cy="0"/>
-        </a:xfrm>
-      </p:grpSpPr>
-      <p:graphicFrame>
-        <p:nvGraphicFramePr>
-          <p:cNvPr id="9" name="표 8"/>
-          <p:cNvGraphicFramePr>
-            <a:graphicFrameLocks noGrp="1"/>
-          </p:cNvGraphicFramePr>
-          <p:nvPr/>
-        </p:nvGraphicFramePr>
-        <p:xfrm>
-          <a:off x="131601" y="1283516"/>
-          <a:ext cx="8032096" cy="5347943"/>
-        </p:xfrm>
-        <a:graphic>
-          <a:graphicData uri="http://schemas.openxmlformats.org/drawingml/2006/table">
-            <a:tbl>
-              <a:tblPr firstRow="1" bandRow="1">
-                <a:tableStyleId>{5C22544A-7EE6-4342-B048-85BDC9FD1C3A}</a:tableStyleId>
-              </a:tblPr>
-              <a:tblGrid>
-                <a:gridCol w="8032096">
-                  <a:extLst>
-                    <a:ext uri="{9D8B030D-6E8A-4147-A177-3AD203B41FA5}">
-                      <a16:colId xmlns="" xmlns:a16="http://schemas.microsoft.com/office/drawing/2014/main" val="20000"/>
-                    </a:ext>
-                  </a:extLst>
-                </a:gridCol>
-              </a:tblGrid>
-              <a:tr h="5347943">
-                <a:tc>
-                  <a:txBody>
-                    <a:bodyPr/>
-                    <a:lstStyle/>
-                    <a:p>
-                      <a:pPr latinLnBrk="1"/>
-                      <a:endParaRPr lang="ko-KR" altLang="en-US" dirty="0"/>
-                    </a:p>
-                  </a:txBody>
-                  <a:tcPr>
-                    <a:lnL w="12700" cap="flat" cmpd="sng" algn="ctr">
-                      <a:solidFill>
-                        <a:schemeClr val="tx1"/>
-                      </a:solidFill>
-                      <a:prstDash val="solid"/>
-                      <a:round/>
-                      <a:headEnd type="none" w="med" len="med"/>
-                      <a:tailEnd type="none" w="med" len="med"/>
-                    </a:lnL>
-                    <a:lnR w="12700" cap="flat" cmpd="sng" algn="ctr">
-                      <a:solidFill>
-                        <a:schemeClr val="tx1"/>
-                      </a:solidFill>
-                      <a:prstDash val="solid"/>
-                      <a:round/>
-                      <a:headEnd type="none" w="med" len="med"/>
-                      <a:tailEnd type="none" w="med" len="med"/>
-                    </a:lnR>
-                    <a:lnT w="12700" cap="flat" cmpd="sng" algn="ctr">
-                      <a:solidFill>
-                        <a:schemeClr val="tx1"/>
-                      </a:solidFill>
-                      <a:prstDash val="solid"/>
-                      <a:round/>
-                      <a:headEnd type="none" w="med" len="med"/>
-                      <a:tailEnd type="none" w="med" len="med"/>
-                    </a:lnT>
-                    <a:lnB w="12700" cap="flat" cmpd="sng" algn="ctr">
-                      <a:solidFill>
-                        <a:schemeClr val="tx1"/>
-                      </a:solidFill>
-                      <a:prstDash val="solid"/>
-                      <a:round/>
-                      <a:headEnd type="none" w="med" len="med"/>
-                      <a:tailEnd type="none" w="med" len="med"/>
-                    </a:lnB>
-                    <a:lnTlToBr w="12700" cmpd="sng">
-                      <a:noFill/>
-                      <a:prstDash val="solid"/>
-                    </a:lnTlToBr>
-                    <a:lnBlToTr w="12700" cmpd="sng">
-                      <a:noFill/>
-                      <a:prstDash val="solid"/>
-                    </a:lnBlToTr>
-                    <a:solidFill>
-                      <a:schemeClr val="bg1"/>
-                    </a:solidFill>
-                  </a:tcPr>
-                </a:tc>
-                <a:extLst>
-                  <a:ext uri="{0D108BD9-81ED-4DB2-BD59-A6C34878D82A}">
-                    <a16:rowId xmlns="" xmlns:a16="http://schemas.microsoft.com/office/drawing/2014/main" val="10000"/>
-                  </a:ext>
-                </a:extLst>
-              </a:tr>
-            </a:tbl>
-          </a:graphicData>
-        </a:graphic>
-      </p:graphicFrame>
-      <p:graphicFrame>
-        <p:nvGraphicFramePr>
-          <p:cNvPr id="21" name="표 13"/>
-          <p:cNvGraphicFramePr/>
-          <p:nvPr>
-            <p:extLst>
-              <p:ext uri="{D42A27DB-BD31-4B8C-83A1-F6EECF244321}">
-                <p14:modId xmlns:p14="http://schemas.microsoft.com/office/powerpoint/2010/main" val="529092814"/>
-              </p:ext>
-            </p:extLst>
-          </p:nvPr>
-        </p:nvGraphicFramePr>
-        <p:xfrm>
-          <a:off x="8494241" y="2405366"/>
-          <a:ext cx="3491813" cy="1326453"/>
-        </p:xfrm>
-        <a:graphic>
-          <a:graphicData uri="http://schemas.openxmlformats.org/drawingml/2006/table">
-            <a:tbl>
-              <a:tblPr firstRow="1"/>
-              <a:tblGrid>
-                <a:gridCol w="342705">
-                  <a:extLst>
-                    <a:ext uri="{9D8B030D-6E8A-4147-A177-3AD203B41FA5}">
-                      <a16:colId xmlns="" xmlns:a16="http://schemas.microsoft.com/office/drawing/2014/main" val="20000"/>
-                    </a:ext>
-                  </a:extLst>
-                </a:gridCol>
-                <a:gridCol w="3149108">
-                  <a:extLst>
-                    <a:ext uri="{9D8B030D-6E8A-4147-A177-3AD203B41FA5}">
-                      <a16:colId xmlns="" xmlns:a16="http://schemas.microsoft.com/office/drawing/2014/main" val="20001"/>
-                    </a:ext>
-                  </a:extLst>
-                </a:gridCol>
-              </a:tblGrid>
-              <a:tr h="378460">
-                <a:tc>
-                  <a:txBody>
-                    <a:bodyPr/>
-                    <a:lstStyle/>
-                    <a:p>
-                      <a:pPr algn="ctr">
-                        <a:defRPr sz="1800" b="0">
-                          <a:solidFill>
-                            <a:srgbClr val="000000"/>
-                          </a:solidFill>
-                        </a:defRPr>
-                      </a:pPr>
-                      <a:r>
-                        <a:rPr sz="1500" b="1" dirty="0"/>
-                        <a:t>#</a:t>
-                      </a:r>
-                    </a:p>
-                  </a:txBody>
-                  <a:tcPr marL="45720" marR="45720" anchor="ctr" horzOverflow="overflow">
-                    <a:lnL w="12700">
-                      <a:solidFill>
-                        <a:srgbClr val="000000"/>
-                      </a:solidFill>
-                    </a:lnL>
-                    <a:lnR w="12700">
-                      <a:solidFill>
-                        <a:srgbClr val="000000"/>
-                      </a:solidFill>
-                    </a:lnR>
-                    <a:lnT w="12700">
-                      <a:solidFill>
-                        <a:srgbClr val="000000"/>
-                      </a:solidFill>
-                    </a:lnT>
-                    <a:lnB w="12700">
-                      <a:solidFill>
-                        <a:srgbClr val="000000"/>
-                      </a:solidFill>
-                    </a:lnB>
-                    <a:solidFill>
-                      <a:srgbClr val="D9D9D9"/>
-                    </a:solidFill>
-                  </a:tcPr>
-                </a:tc>
-                <a:tc>
-                  <a:txBody>
-                    <a:bodyPr/>
-                    <a:lstStyle/>
-                    <a:p>
-                      <a:pPr algn="ctr">
-                        <a:defRPr sz="1800" b="0">
-                          <a:solidFill>
-                            <a:srgbClr val="000000"/>
-                          </a:solidFill>
-                        </a:defRPr>
-                      </a:pPr>
-                      <a:r>
-                        <a:rPr sz="1500" b="1"/>
-                        <a:t>기능명</a:t>
-                      </a:r>
-                    </a:p>
-                  </a:txBody>
-                  <a:tcPr marL="45720" marR="45720" anchor="ctr" horzOverflow="overflow">
-                    <a:lnL w="12700">
-                      <a:solidFill>
-                        <a:srgbClr val="000000"/>
-                      </a:solidFill>
-                    </a:lnL>
-                    <a:lnR w="12700">
-                      <a:solidFill>
-                        <a:srgbClr val="000000"/>
-                      </a:solidFill>
-                    </a:lnR>
-                    <a:lnT w="12700">
-                      <a:solidFill>
-                        <a:srgbClr val="000000"/>
-                      </a:solidFill>
-                    </a:lnT>
-                    <a:lnB w="12700">
-                      <a:solidFill>
-                        <a:srgbClr val="000000"/>
-                      </a:solidFill>
-                    </a:lnB>
-                    <a:solidFill>
-                      <a:srgbClr val="D9D9D9"/>
-                    </a:solidFill>
-                  </a:tcPr>
-                </a:tc>
-                <a:extLst>
-                  <a:ext uri="{0D108BD9-81ED-4DB2-BD59-A6C34878D82A}">
-                    <a16:rowId xmlns="" xmlns:a16="http://schemas.microsoft.com/office/drawing/2014/main" val="10000"/>
-                  </a:ext>
-                </a:extLst>
-              </a:tr>
-              <a:tr h="947993">
-                <a:tc>
-                  <a:txBody>
-                    <a:bodyPr/>
-                    <a:lstStyle/>
-                    <a:p>
-                      <a:pPr algn="ctr">
-                        <a:defRPr sz="1800"/>
-                      </a:pPr>
-                      <a:r>
-                        <a:rPr sz="1500"/>
-                        <a:t>1</a:t>
-                      </a:r>
-                    </a:p>
-                  </a:txBody>
-                  <a:tcPr marL="45720" marR="45720" anchor="ctr" horzOverflow="overflow">
-                    <a:lnL w="12700">
-                      <a:solidFill>
-                        <a:srgbClr val="000000"/>
-                      </a:solidFill>
-                    </a:lnL>
-                    <a:lnR w="12700">
-                      <a:solidFill>
-                        <a:srgbClr val="000000"/>
-                      </a:solidFill>
-                    </a:lnR>
-                    <a:lnT w="12700">
-                      <a:solidFill>
-                        <a:srgbClr val="000000"/>
-                      </a:solidFill>
-                    </a:lnT>
-                    <a:lnB w="12700">
-                      <a:solidFill>
-                        <a:srgbClr val="000000"/>
-                      </a:solidFill>
-                    </a:lnB>
-                    <a:solidFill>
-                      <a:srgbClr val="FFFFFF"/>
-                    </a:solidFill>
-                  </a:tcPr>
-                </a:tc>
-                <a:tc>
-                  <a:txBody>
-                    <a:bodyPr/>
-                    <a:lstStyle/>
-                    <a:p>
-                      <a:pPr algn="l">
-                        <a:defRPr sz="1500"/>
-                      </a:pPr>
-                      <a:r>
-                        <a:rPr lang="ko-KR" altLang="en-US" dirty="0" smtClean="0"/>
-                        <a:t>세미나 소개</a:t>
-                      </a:r>
-                      <a:endParaRPr lang="en-US" altLang="ko-KR" dirty="0" smtClean="0"/>
-                    </a:p>
-                    <a:p>
-                      <a:pPr algn="l">
-                        <a:defRPr sz="1500"/>
-                      </a:pPr>
-                      <a:r>
-                        <a:rPr lang="en-US" sz="1200" dirty="0" smtClean="0"/>
-                        <a:t>- </a:t>
-                      </a:r>
-                      <a:r>
-                        <a:rPr lang="ko-KR" altLang="en-US" sz="1200" dirty="0" err="1" smtClean="0"/>
-                        <a:t>콘텐츠</a:t>
-                      </a:r>
-                      <a:endParaRPr sz="1200" dirty="0"/>
-                    </a:p>
-                  </a:txBody>
-                  <a:tcPr marL="45720" marR="45720" horzOverflow="overflow">
-                    <a:lnL w="12700">
-                      <a:solidFill>
-                        <a:srgbClr val="000000"/>
-                      </a:solidFill>
-                    </a:lnL>
-                    <a:lnR w="12700">
-                      <a:solidFill>
-                        <a:srgbClr val="000000"/>
-                      </a:solidFill>
-                    </a:lnR>
-                    <a:lnT w="12700">
-                      <a:solidFill>
-                        <a:srgbClr val="000000"/>
-                      </a:solidFill>
-                    </a:lnT>
-                    <a:lnB w="12700">
-                      <a:solidFill>
-                        <a:srgbClr val="000000"/>
-                      </a:solidFill>
-                    </a:lnB>
-                    <a:solidFill>
-                      <a:srgbClr val="FFFFFF"/>
-                    </a:solidFill>
-                  </a:tcPr>
-                </a:tc>
-                <a:extLst>
-                  <a:ext uri="{0D108BD9-81ED-4DB2-BD59-A6C34878D82A}">
-                    <a16:rowId xmlns="" xmlns:a16="http://schemas.microsoft.com/office/drawing/2014/main" val="10001"/>
-                  </a:ext>
-                </a:extLst>
-              </a:tr>
-            </a:tbl>
-          </a:graphicData>
-        </a:graphic>
-      </p:graphicFrame>
-      <p:pic>
-        <p:nvPicPr>
-          <p:cNvPr id="2" name="그림 1"/>
-          <p:cNvPicPr>
-            <a:picLocks noChangeAspect="1"/>
-          </p:cNvPicPr>
-          <p:nvPr/>
-        </p:nvPicPr>
-        <p:blipFill>
-          <a:blip r:embed="rId2"/>
-          <a:stretch>
-            <a:fillRect/>
-          </a:stretch>
-        </p:blipFill>
-        <p:spPr>
-          <a:xfrm>
-            <a:off x="2796702" y="1479639"/>
-            <a:ext cx="2633432" cy="4955695"/>
-          </a:xfrm>
-          <a:prstGeom prst="rect">
-            <a:avLst/>
-          </a:prstGeom>
-          <a:ln>
-            <a:solidFill>
-              <a:schemeClr val="tx1"/>
-            </a:solidFill>
-          </a:ln>
-        </p:spPr>
-      </p:pic>
-      <p:graphicFrame>
-        <p:nvGraphicFramePr>
-          <p:cNvPr id="10" name="표 9"/>
-          <p:cNvGraphicFramePr>
-            <a:graphicFrameLocks noGrp="1"/>
-          </p:cNvGraphicFramePr>
-          <p:nvPr>
-            <p:extLst>
-              <p:ext uri="{D42A27DB-BD31-4B8C-83A1-F6EECF244321}">
-                <p14:modId xmlns:p14="http://schemas.microsoft.com/office/powerpoint/2010/main" val="81902425"/>
-              </p:ext>
-            </p:extLst>
-          </p:nvPr>
-        </p:nvGraphicFramePr>
-        <p:xfrm>
-          <a:off x="8494241" y="1283516"/>
-          <a:ext cx="3491813" cy="848244"/>
-        </p:xfrm>
-        <a:graphic>
-          <a:graphicData uri="http://schemas.openxmlformats.org/drawingml/2006/table">
-            <a:tbl>
-              <a:tblPr firstRow="1" bandRow="1">
-                <a:noFill/>
-              </a:tblPr>
-              <a:tblGrid>
-                <a:gridCol w="3491813"/>
-              </a:tblGrid>
-              <a:tr h="413450">
-                <a:tc>
-                  <a:txBody>
-                    <a:bodyPr/>
-                    <a:lstStyle/>
-                    <a:p>
-                      <a:pPr marL="0" marR="0" lvl="0" indent="0" algn="ctr" rtl="0">
-                        <a:lnSpc>
-                          <a:spcPct val="100000"/>
-                        </a:lnSpc>
-                        <a:spcBef>
-                          <a:spcPts val="0"/>
-                        </a:spcBef>
-                        <a:spcAft>
-                          <a:spcPts val="0"/>
-                        </a:spcAft>
-                        <a:buClr>
-                          <a:srgbClr val="000000"/>
-                        </a:buClr>
-                        <a:buSzPts val="1500"/>
-                        <a:buFont typeface="Arial"/>
-                        <a:buNone/>
-                      </a:pPr>
-                      <a:r>
-                        <a:rPr lang="ko-KR" altLang="en-US" sz="1700" b="0" u="none" strike="noStrike" cap="none" dirty="0" smtClean="0">
-                          <a:solidFill>
-                            <a:schemeClr val="dk1"/>
-                          </a:solidFill>
-                        </a:rPr>
-                        <a:t>화면코드</a:t>
-                      </a:r>
-                      <a:endParaRPr sz="1700" b="0" u="none" strike="noStrike" cap="none" dirty="0">
-                        <a:solidFill>
-                          <a:schemeClr val="dk1"/>
-                        </a:solidFill>
-                      </a:endParaRPr>
-                    </a:p>
-                  </a:txBody>
-                  <a:tcPr marL="74304" marR="74304" marT="45725" marB="45725" anchor="ctr">
-                    <a:lnL w="12700" cap="flat" cmpd="sng">
-                      <a:solidFill>
-                        <a:schemeClr val="dk1"/>
-                      </a:solidFill>
-                      <a:prstDash val="solid"/>
-                      <a:round/>
-                      <a:headEnd type="none" w="sm" len="sm"/>
-                      <a:tailEnd type="none" w="sm" len="sm"/>
-                    </a:lnL>
-                    <a:lnR w="12700" cap="flat" cmpd="sng">
-                      <a:solidFill>
-                        <a:schemeClr val="dk1"/>
-                      </a:solidFill>
-                      <a:prstDash val="solid"/>
-                      <a:round/>
-                      <a:headEnd type="none" w="sm" len="sm"/>
-                      <a:tailEnd type="none" w="sm" len="sm"/>
-                    </a:lnR>
-                    <a:lnT w="12700" cap="flat" cmpd="sng">
-                      <a:solidFill>
-                        <a:schemeClr val="dk1"/>
-                      </a:solidFill>
-                      <a:prstDash val="solid"/>
-                      <a:round/>
-                      <a:headEnd type="none" w="sm" len="sm"/>
-                      <a:tailEnd type="none" w="sm" len="sm"/>
-                    </a:lnT>
-                    <a:lnB w="12700" cap="flat" cmpd="sng" algn="ctr">
-                      <a:solidFill>
-                        <a:schemeClr val="dk1"/>
-                      </a:solidFill>
-                      <a:prstDash val="solid"/>
-                      <a:round/>
-                      <a:headEnd type="none" w="sm" len="sm"/>
-                      <a:tailEnd type="none" w="sm" len="sm"/>
-                    </a:lnB>
-                    <a:solidFill>
-                      <a:srgbClr val="D8D8D8"/>
-                    </a:solidFill>
-                  </a:tcPr>
-                </a:tc>
-              </a:tr>
-              <a:tr h="434794">
-                <a:tc>
-                  <a:txBody>
-                    <a:bodyPr/>
-                    <a:lstStyle/>
-                    <a:p>
-                      <a:pPr marL="0" marR="0" lvl="0" indent="0" algn="ctr" defTabSz="914400" rtl="0" eaLnBrk="1" fontAlgn="auto" latinLnBrk="1" hangingPunct="1">
-                        <a:lnSpc>
-                          <a:spcPct val="100000"/>
-                        </a:lnSpc>
-                        <a:spcBef>
-                          <a:spcPts val="0"/>
-                        </a:spcBef>
-                        <a:spcAft>
-                          <a:spcPts val="0"/>
-                        </a:spcAft>
-                        <a:buClrTx/>
-                        <a:buSzTx/>
-                        <a:buFontTx/>
-                        <a:buNone/>
-                        <a:tabLst/>
-                        <a:defRPr sz="1000" b="0">
-                          <a:solidFill>
-                            <a:srgbClr val="000000"/>
-                          </a:solidFill>
-                          <a:latin typeface="Arial"/>
-                          <a:ea typeface="Arial"/>
-                          <a:cs typeface="Arial"/>
-                          <a:sym typeface="Arial"/>
-                        </a:defRPr>
-                      </a:pPr>
-                      <a:r>
-                        <a:rPr lang="en-US" altLang="ko-KR" sz="1700" b="0" u="none" strike="noStrike" cap="none" dirty="0" err="1" smtClean="0">
-                          <a:solidFill>
-                            <a:schemeClr val="dk1"/>
-                          </a:solidFill>
-                        </a:rPr>
-                        <a:t>sh_user_m_semiDetail</a:t>
-                      </a:r>
-                      <a:endParaRPr lang="en-US" altLang="ko-KR" sz="1700" b="0" u="none" strike="noStrike" cap="none" dirty="0">
-                        <a:solidFill>
-                          <a:schemeClr val="dk1"/>
-                        </a:solidFill>
-                      </a:endParaRPr>
-                    </a:p>
-                  </a:txBody>
-                  <a:tcPr marL="74304" marR="74304" marT="45725" marB="45725" anchor="ctr">
-                    <a:lnL w="12700" cap="flat" cmpd="sng" algn="ctr">
-                      <a:solidFill>
-                        <a:schemeClr val="dk1"/>
-                      </a:solidFill>
-                      <a:prstDash val="solid"/>
-                      <a:round/>
-                      <a:headEnd type="none" w="sm" len="sm"/>
-                      <a:tailEnd type="none" w="sm" len="sm"/>
-                    </a:lnL>
-                    <a:lnR w="12700" cap="flat" cmpd="sng" algn="ctr">
-                      <a:solidFill>
-                        <a:schemeClr val="dk1"/>
-                      </a:solidFill>
-                      <a:prstDash val="solid"/>
-                      <a:round/>
-                      <a:headEnd type="none" w="sm" len="sm"/>
-                      <a:tailEnd type="none" w="sm" len="sm"/>
-                    </a:lnR>
-                    <a:lnT w="12700" cap="flat" cmpd="sng" algn="ctr">
-                      <a:solidFill>
-                        <a:schemeClr val="dk1"/>
-                      </a:solidFill>
-                      <a:prstDash val="solid"/>
-                      <a:round/>
-                      <a:headEnd type="none" w="sm" len="sm"/>
-                      <a:tailEnd type="none" w="sm" len="sm"/>
-                    </a:lnT>
-                    <a:lnB w="12700" cap="flat" cmpd="sng">
-                      <a:solidFill>
-                        <a:schemeClr val="dk1"/>
-                      </a:solidFill>
-                      <a:prstDash val="solid"/>
-                      <a:round/>
-                      <a:headEnd type="none" w="sm" len="sm"/>
-                      <a:tailEnd type="none" w="sm" len="sm"/>
-                    </a:lnB>
-                    <a:solidFill>
-                      <a:schemeClr val="bg1"/>
-                    </a:solidFill>
-                  </a:tcPr>
-                </a:tc>
-              </a:tr>
-            </a:tbl>
-          </a:graphicData>
-        </a:graphic>
-      </p:graphicFrame>
-      <p:sp>
-        <p:nvSpPr>
-          <p:cNvPr id="7" name="직사각형 6"/>
-          <p:cNvSpPr/>
-          <p:nvPr/>
-        </p:nvSpPr>
-        <p:spPr>
-          <a:xfrm>
-            <a:off x="114866" y="241014"/>
-            <a:ext cx="7765267" cy="477054"/>
-          </a:xfrm>
-          <a:prstGeom prst="rect">
-            <a:avLst/>
-          </a:prstGeom>
-        </p:spPr>
-        <p:txBody>
-          <a:bodyPr wrap="none">
-            <a:spAutoFit/>
-          </a:bodyPr>
-          <a:lstStyle/>
-          <a:p>
-            <a:pPr lvl="0">
-              <a:buClr>
-                <a:srgbClr val="000000"/>
-              </a:buClr>
-              <a:buSzPts val="1500"/>
-              <a:defRPr/>
-            </a:pPr>
-            <a:r>
-              <a:rPr lang="en-US" altLang="ko-KR" sz="2500" dirty="0" smtClean="0">
-                <a:solidFill>
-                  <a:schemeClr val="bg1"/>
-                </a:solidFill>
-                <a:latin typeface="+mj-lt"/>
-              </a:rPr>
-              <a:t>[</a:t>
-            </a:r>
-            <a:r>
-              <a:rPr lang="ko-KR" altLang="en-US" sz="2500" dirty="0" smtClean="0">
-                <a:solidFill>
-                  <a:schemeClr val="bg1"/>
-                </a:solidFill>
-                <a:latin typeface="+mj-lt"/>
-              </a:rPr>
-              <a:t>화면 설계</a:t>
-            </a:r>
-            <a:r>
-              <a:rPr lang="en-US" altLang="ko-KR" sz="2500" dirty="0" smtClean="0">
-                <a:solidFill>
-                  <a:schemeClr val="bg1"/>
-                </a:solidFill>
-                <a:latin typeface="+mj-lt"/>
-              </a:rPr>
-              <a:t>]</a:t>
-            </a:r>
-            <a:r>
-              <a:rPr lang="ko-KR" altLang="en-US" sz="2500" dirty="0">
-                <a:solidFill>
-                  <a:schemeClr val="bg1"/>
-                </a:solidFill>
-              </a:rPr>
-              <a:t> 사용자</a:t>
-            </a:r>
-            <a:r>
-              <a:rPr lang="en-US" altLang="ko-KR" sz="2500" dirty="0">
-                <a:solidFill>
-                  <a:schemeClr val="bg1"/>
-                </a:solidFill>
-              </a:rPr>
-              <a:t> - </a:t>
-            </a:r>
-            <a:r>
-              <a:rPr lang="ko-KR" altLang="en-US" sz="2500" dirty="0" err="1">
-                <a:solidFill>
-                  <a:schemeClr val="bg1"/>
-                </a:solidFill>
-              </a:rPr>
-              <a:t>모바일</a:t>
-            </a:r>
-            <a:r>
-              <a:rPr lang="ko-KR" altLang="en-US" sz="2500" dirty="0">
-                <a:solidFill>
-                  <a:schemeClr val="bg1"/>
-                </a:solidFill>
-              </a:rPr>
-              <a:t> </a:t>
-            </a:r>
-            <a:r>
-              <a:rPr lang="en-US" altLang="ko-KR" sz="2500" dirty="0" smtClean="0">
-                <a:solidFill>
-                  <a:schemeClr val="bg1"/>
-                </a:solidFill>
-                <a:latin typeface="+mj-lt"/>
-              </a:rPr>
-              <a:t>– </a:t>
-            </a:r>
-            <a:r>
-              <a:rPr lang="ko-KR" altLang="en-US" sz="2500" dirty="0" smtClean="0">
-                <a:solidFill>
-                  <a:schemeClr val="bg1"/>
-                </a:solidFill>
-                <a:latin typeface="+mj-lt"/>
-              </a:rPr>
-              <a:t>세미나 상세페이지 </a:t>
-            </a:r>
-            <a:r>
-              <a:rPr lang="en-US" altLang="ko-KR" sz="2500" dirty="0" smtClean="0">
-                <a:solidFill>
-                  <a:schemeClr val="bg1"/>
-                </a:solidFill>
-                <a:latin typeface="+mj-lt"/>
-              </a:rPr>
-              <a:t>- 2</a:t>
-            </a:r>
-            <a:endParaRPr lang="ko-KR" altLang="en-US" sz="2500" dirty="0">
-              <a:solidFill>
-                <a:schemeClr val="bg1"/>
-              </a:solidFill>
-              <a:latin typeface="+mj-lt"/>
-            </a:endParaRPr>
-          </a:p>
-        </p:txBody>
-      </p:sp>
-    </p:spTree>
-    <p:extLst>
-      <p:ext uri="{BB962C8B-B14F-4D97-AF65-F5344CB8AC3E}">
-        <p14:creationId xmlns:p14="http://schemas.microsoft.com/office/powerpoint/2010/main" val="3543852197"/>
-      </p:ext>
-    </p:extLst>
-  </p:cSld>
-  <p:clrMapOvr>
-    <a:masterClrMapping/>
-  </p:clrMapOvr>
-  <p:timing>
-    <p:tnLst>
-      <p:par>
-        <p:cTn id="1" dur="indefinite" restart="never" nodeType="tmRoot"/>
-      </p:par>
-    </p:tnLst>
-  </p:timing>
-</p:sld>
-</file>
-
-<file path=ppt/slides/slide17.xml><?xml version="1.0" encoding="utf-8"?>
-<p:sld xmlns:a="http://schemas.openxmlformats.org/drawingml/2006/main" xmlns:r="http://schemas.openxmlformats.org/officeDocument/2006/relationships" xmlns:p="http://schemas.openxmlformats.org/presentationml/2006/main">
-  <p:cSld>
-    <p:spTree>
-      <p:nvGrpSpPr>
-        <p:cNvPr id="1" name=""/>
-        <p:cNvGrpSpPr/>
-        <p:nvPr/>
-      </p:nvGrpSpPr>
-      <p:grpSpPr>
-        <a:xfrm>
-          <a:off x="0" y="0"/>
-          <a:ext cx="0" cy="0"/>
-          <a:chOff x="0" y="0"/>
-          <a:chExt cx="0" cy="0"/>
-        </a:xfrm>
-      </p:grpSpPr>
-      <p:graphicFrame>
-        <p:nvGraphicFramePr>
-          <p:cNvPr id="9" name="표 8"/>
-          <p:cNvGraphicFramePr>
-            <a:graphicFrameLocks noGrp="1"/>
-          </p:cNvGraphicFramePr>
-          <p:nvPr/>
-        </p:nvGraphicFramePr>
-        <p:xfrm>
-          <a:off x="131601" y="1283516"/>
-          <a:ext cx="8032096" cy="5347943"/>
-        </p:xfrm>
-        <a:graphic>
-          <a:graphicData uri="http://schemas.openxmlformats.org/drawingml/2006/table">
-            <a:tbl>
-              <a:tblPr firstRow="1" bandRow="1">
-                <a:tableStyleId>{5C22544A-7EE6-4342-B048-85BDC9FD1C3A}</a:tableStyleId>
-              </a:tblPr>
-              <a:tblGrid>
-                <a:gridCol w="8032096">
-                  <a:extLst>
-                    <a:ext uri="{9D8B030D-6E8A-4147-A177-3AD203B41FA5}">
-                      <a16:colId xmlns="" xmlns:a16="http://schemas.microsoft.com/office/drawing/2014/main" val="20000"/>
-                    </a:ext>
-                  </a:extLst>
-                </a:gridCol>
-              </a:tblGrid>
-              <a:tr h="5347943">
-                <a:tc>
-                  <a:txBody>
-                    <a:bodyPr/>
-                    <a:lstStyle/>
-                    <a:p>
-                      <a:pPr latinLnBrk="1"/>
-                      <a:endParaRPr lang="ko-KR" altLang="en-US" dirty="0"/>
-                    </a:p>
-                  </a:txBody>
-                  <a:tcPr>
-                    <a:lnL w="12700" cap="flat" cmpd="sng" algn="ctr">
-                      <a:solidFill>
-                        <a:schemeClr val="tx1"/>
-                      </a:solidFill>
-                      <a:prstDash val="solid"/>
-                      <a:round/>
-                      <a:headEnd type="none" w="med" len="med"/>
-                      <a:tailEnd type="none" w="med" len="med"/>
-                    </a:lnL>
-                    <a:lnR w="12700" cap="flat" cmpd="sng" algn="ctr">
-                      <a:solidFill>
-                        <a:schemeClr val="tx1"/>
-                      </a:solidFill>
-                      <a:prstDash val="solid"/>
-                      <a:round/>
-                      <a:headEnd type="none" w="med" len="med"/>
-                      <a:tailEnd type="none" w="med" len="med"/>
-                    </a:lnR>
-                    <a:lnT w="12700" cap="flat" cmpd="sng" algn="ctr">
-                      <a:solidFill>
-                        <a:schemeClr val="tx1"/>
-                      </a:solidFill>
-                      <a:prstDash val="solid"/>
-                      <a:round/>
-                      <a:headEnd type="none" w="med" len="med"/>
-                      <a:tailEnd type="none" w="med" len="med"/>
-                    </a:lnT>
-                    <a:lnB w="12700" cap="flat" cmpd="sng" algn="ctr">
-                      <a:solidFill>
-                        <a:schemeClr val="tx1"/>
-                      </a:solidFill>
-                      <a:prstDash val="solid"/>
-                      <a:round/>
-                      <a:headEnd type="none" w="med" len="med"/>
-                      <a:tailEnd type="none" w="med" len="med"/>
-                    </a:lnB>
-                    <a:lnTlToBr w="12700" cmpd="sng">
-                      <a:noFill/>
-                      <a:prstDash val="solid"/>
-                    </a:lnTlToBr>
-                    <a:lnBlToTr w="12700" cmpd="sng">
-                      <a:noFill/>
-                      <a:prstDash val="solid"/>
-                    </a:lnBlToTr>
-                    <a:solidFill>
-                      <a:schemeClr val="bg1"/>
-                    </a:solidFill>
-                  </a:tcPr>
-                </a:tc>
-                <a:extLst>
-                  <a:ext uri="{0D108BD9-81ED-4DB2-BD59-A6C34878D82A}">
-                    <a16:rowId xmlns="" xmlns:a16="http://schemas.microsoft.com/office/drawing/2014/main" val="10000"/>
-                  </a:ext>
-                </a:extLst>
-              </a:tr>
-            </a:tbl>
-          </a:graphicData>
-        </a:graphic>
-      </p:graphicFrame>
-      <p:graphicFrame>
-        <p:nvGraphicFramePr>
-          <p:cNvPr id="21" name="표 13"/>
-          <p:cNvGraphicFramePr/>
-          <p:nvPr>
-            <p:extLst>
-              <p:ext uri="{D42A27DB-BD31-4B8C-83A1-F6EECF244321}">
-                <p14:modId xmlns:p14="http://schemas.microsoft.com/office/powerpoint/2010/main" val="2445733146"/>
-              </p:ext>
-            </p:extLst>
-          </p:nvPr>
-        </p:nvGraphicFramePr>
-        <p:xfrm>
-          <a:off x="8550875" y="2392244"/>
-          <a:ext cx="3491813" cy="1326453"/>
-        </p:xfrm>
-        <a:graphic>
-          <a:graphicData uri="http://schemas.openxmlformats.org/drawingml/2006/table">
-            <a:tbl>
-              <a:tblPr firstRow="1"/>
-              <a:tblGrid>
-                <a:gridCol w="342705">
-                  <a:extLst>
-                    <a:ext uri="{9D8B030D-6E8A-4147-A177-3AD203B41FA5}">
-                      <a16:colId xmlns="" xmlns:a16="http://schemas.microsoft.com/office/drawing/2014/main" val="20000"/>
-                    </a:ext>
-                  </a:extLst>
-                </a:gridCol>
-                <a:gridCol w="3149108">
-                  <a:extLst>
-                    <a:ext uri="{9D8B030D-6E8A-4147-A177-3AD203B41FA5}">
-                      <a16:colId xmlns="" xmlns:a16="http://schemas.microsoft.com/office/drawing/2014/main" val="20001"/>
-                    </a:ext>
-                  </a:extLst>
-                </a:gridCol>
-              </a:tblGrid>
-              <a:tr h="378460">
-                <a:tc>
-                  <a:txBody>
-                    <a:bodyPr/>
-                    <a:lstStyle/>
-                    <a:p>
-                      <a:pPr algn="ctr">
-                        <a:defRPr sz="1800" b="0">
-                          <a:solidFill>
-                            <a:srgbClr val="000000"/>
-                          </a:solidFill>
-                        </a:defRPr>
-                      </a:pPr>
-                      <a:r>
-                        <a:rPr sz="1500" b="1" dirty="0"/>
-                        <a:t>#</a:t>
-                      </a:r>
-                    </a:p>
-                  </a:txBody>
-                  <a:tcPr marL="45720" marR="45720" anchor="ctr" horzOverflow="overflow">
-                    <a:lnL w="12700">
-                      <a:solidFill>
-                        <a:srgbClr val="000000"/>
-                      </a:solidFill>
-                    </a:lnL>
-                    <a:lnR w="12700">
-                      <a:solidFill>
-                        <a:srgbClr val="000000"/>
-                      </a:solidFill>
-                    </a:lnR>
-                    <a:lnT w="12700">
-                      <a:solidFill>
-                        <a:srgbClr val="000000"/>
-                      </a:solidFill>
-                    </a:lnT>
-                    <a:lnB w="12700">
-                      <a:solidFill>
-                        <a:srgbClr val="000000"/>
-                      </a:solidFill>
-                    </a:lnB>
-                    <a:solidFill>
-                      <a:srgbClr val="D9D9D9"/>
-                    </a:solidFill>
-                  </a:tcPr>
-                </a:tc>
-                <a:tc>
-                  <a:txBody>
-                    <a:bodyPr/>
-                    <a:lstStyle/>
-                    <a:p>
-                      <a:pPr algn="ctr">
-                        <a:defRPr sz="1800" b="0">
-                          <a:solidFill>
-                            <a:srgbClr val="000000"/>
-                          </a:solidFill>
-                        </a:defRPr>
-                      </a:pPr>
-                      <a:r>
-                        <a:rPr sz="1500" b="1"/>
-                        <a:t>기능명</a:t>
-                      </a:r>
-                    </a:p>
-                  </a:txBody>
-                  <a:tcPr marL="45720" marR="45720" anchor="ctr" horzOverflow="overflow">
-                    <a:lnL w="12700">
-                      <a:solidFill>
-                        <a:srgbClr val="000000"/>
-                      </a:solidFill>
-                    </a:lnL>
-                    <a:lnR w="12700">
-                      <a:solidFill>
-                        <a:srgbClr val="000000"/>
-                      </a:solidFill>
-                    </a:lnR>
-                    <a:lnT w="12700">
-                      <a:solidFill>
-                        <a:srgbClr val="000000"/>
-                      </a:solidFill>
-                    </a:lnT>
-                    <a:lnB w="12700">
-                      <a:solidFill>
-                        <a:srgbClr val="000000"/>
-                      </a:solidFill>
-                    </a:lnB>
-                    <a:solidFill>
-                      <a:srgbClr val="D9D9D9"/>
-                    </a:solidFill>
-                  </a:tcPr>
-                </a:tc>
-                <a:extLst>
-                  <a:ext uri="{0D108BD9-81ED-4DB2-BD59-A6C34878D82A}">
-                    <a16:rowId xmlns="" xmlns:a16="http://schemas.microsoft.com/office/drawing/2014/main" val="10000"/>
-                  </a:ext>
-                </a:extLst>
-              </a:tr>
-              <a:tr h="947993">
-                <a:tc>
-                  <a:txBody>
-                    <a:bodyPr/>
-                    <a:lstStyle/>
-                    <a:p>
-                      <a:pPr algn="ctr">
-                        <a:defRPr sz="1800"/>
-                      </a:pPr>
-                      <a:r>
-                        <a:rPr sz="1500"/>
-                        <a:t>1</a:t>
-                      </a:r>
-                    </a:p>
-                  </a:txBody>
-                  <a:tcPr marL="45720" marR="45720" anchor="ctr" horzOverflow="overflow">
-                    <a:lnL w="12700">
-                      <a:solidFill>
-                        <a:srgbClr val="000000"/>
-                      </a:solidFill>
-                    </a:lnL>
-                    <a:lnR w="12700">
-                      <a:solidFill>
-                        <a:srgbClr val="000000"/>
-                      </a:solidFill>
-                    </a:lnR>
-                    <a:lnT w="12700">
-                      <a:solidFill>
-                        <a:srgbClr val="000000"/>
-                      </a:solidFill>
-                    </a:lnT>
-                    <a:lnB w="12700">
-                      <a:solidFill>
-                        <a:srgbClr val="000000"/>
-                      </a:solidFill>
-                    </a:lnB>
-                    <a:solidFill>
-                      <a:srgbClr val="FFFFFF"/>
-                    </a:solidFill>
-                  </a:tcPr>
-                </a:tc>
-                <a:tc>
-                  <a:txBody>
-                    <a:bodyPr/>
-                    <a:lstStyle/>
-                    <a:p>
-                      <a:pPr algn="l">
-                        <a:defRPr sz="1500"/>
-                      </a:pPr>
-                      <a:r>
-                        <a:rPr lang="ko-KR" altLang="en-US" dirty="0" smtClean="0"/>
-                        <a:t>주의사항</a:t>
-                      </a:r>
-                      <a:r>
-                        <a:rPr lang="en-US" altLang="ko-KR" dirty="0" smtClean="0"/>
-                        <a:t>/</a:t>
-                      </a:r>
-                      <a:r>
-                        <a:rPr lang="ko-KR" altLang="en-US" dirty="0" smtClean="0"/>
-                        <a:t>안내</a:t>
-                      </a:r>
-                      <a:endParaRPr lang="en-US" altLang="ko-KR" dirty="0" smtClean="0"/>
-                    </a:p>
-                    <a:p>
-                      <a:pPr marL="171450" indent="-171450" algn="l">
-                        <a:buFontTx/>
-                        <a:buChar char="-"/>
-                        <a:defRPr sz="1500"/>
-                      </a:pPr>
-                      <a:r>
-                        <a:rPr lang="ko-KR" altLang="en-US" sz="1200" dirty="0" smtClean="0"/>
-                        <a:t>정보</a:t>
-                      </a:r>
-                      <a:r>
-                        <a:rPr lang="ko-KR" altLang="en-US" sz="1200" baseline="0" dirty="0" smtClean="0"/>
-                        <a:t> 제공</a:t>
-                      </a:r>
-                      <a:endParaRPr sz="1200" dirty="0"/>
-                    </a:p>
-                  </a:txBody>
-                  <a:tcPr marL="45720" marR="45720" horzOverflow="overflow">
-                    <a:lnL w="12700">
-                      <a:solidFill>
-                        <a:srgbClr val="000000"/>
-                      </a:solidFill>
-                    </a:lnL>
-                    <a:lnR w="12700">
-                      <a:solidFill>
-                        <a:srgbClr val="000000"/>
-                      </a:solidFill>
-                    </a:lnR>
-                    <a:lnT w="12700">
-                      <a:solidFill>
-                        <a:srgbClr val="000000"/>
-                      </a:solidFill>
-                    </a:lnT>
-                    <a:lnB w="12700">
-                      <a:solidFill>
-                        <a:srgbClr val="000000"/>
-                      </a:solidFill>
-                    </a:lnB>
-                    <a:solidFill>
-                      <a:srgbClr val="FFFFFF"/>
-                    </a:solidFill>
-                  </a:tcPr>
-                </a:tc>
-                <a:extLst>
-                  <a:ext uri="{0D108BD9-81ED-4DB2-BD59-A6C34878D82A}">
-                    <a16:rowId xmlns="" xmlns:a16="http://schemas.microsoft.com/office/drawing/2014/main" val="10001"/>
-                  </a:ext>
-                </a:extLst>
-              </a:tr>
-            </a:tbl>
-          </a:graphicData>
-        </a:graphic>
-      </p:graphicFrame>
-      <p:pic>
-        <p:nvPicPr>
-          <p:cNvPr id="3" name="그림 2"/>
-          <p:cNvPicPr>
-            <a:picLocks noChangeAspect="1"/>
-          </p:cNvPicPr>
-          <p:nvPr/>
-        </p:nvPicPr>
-        <p:blipFill>
-          <a:blip r:embed="rId2"/>
-          <a:stretch>
-            <a:fillRect/>
-          </a:stretch>
-        </p:blipFill>
-        <p:spPr>
-          <a:xfrm>
-            <a:off x="2764243" y="1392195"/>
-            <a:ext cx="2648016" cy="5119148"/>
-          </a:xfrm>
-          <a:prstGeom prst="rect">
-            <a:avLst/>
-          </a:prstGeom>
-          <a:ln>
-            <a:solidFill>
-              <a:schemeClr val="tx1"/>
-            </a:solidFill>
-          </a:ln>
-        </p:spPr>
-      </p:pic>
-      <p:graphicFrame>
-        <p:nvGraphicFramePr>
-          <p:cNvPr id="8" name="표 7"/>
-          <p:cNvGraphicFramePr>
-            <a:graphicFrameLocks noGrp="1"/>
-          </p:cNvGraphicFramePr>
-          <p:nvPr>
-            <p:extLst>
-              <p:ext uri="{D42A27DB-BD31-4B8C-83A1-F6EECF244321}">
-                <p14:modId xmlns:p14="http://schemas.microsoft.com/office/powerpoint/2010/main" val="1426282797"/>
-              </p:ext>
-            </p:extLst>
-          </p:nvPr>
-        </p:nvGraphicFramePr>
-        <p:xfrm>
-          <a:off x="8550875" y="1270394"/>
-          <a:ext cx="3491813" cy="848244"/>
-        </p:xfrm>
-        <a:graphic>
-          <a:graphicData uri="http://schemas.openxmlformats.org/drawingml/2006/table">
-            <a:tbl>
-              <a:tblPr firstRow="1" bandRow="1">
-                <a:noFill/>
-              </a:tblPr>
-              <a:tblGrid>
-                <a:gridCol w="3491813"/>
-              </a:tblGrid>
-              <a:tr h="413450">
-                <a:tc>
-                  <a:txBody>
-                    <a:bodyPr/>
-                    <a:lstStyle/>
-                    <a:p>
-                      <a:pPr marL="0" marR="0" lvl="0" indent="0" algn="ctr" rtl="0">
-                        <a:lnSpc>
-                          <a:spcPct val="100000"/>
-                        </a:lnSpc>
-                        <a:spcBef>
-                          <a:spcPts val="0"/>
-                        </a:spcBef>
-                        <a:spcAft>
-                          <a:spcPts val="0"/>
-                        </a:spcAft>
-                        <a:buClr>
-                          <a:srgbClr val="000000"/>
-                        </a:buClr>
-                        <a:buSzPts val="1500"/>
-                        <a:buFont typeface="Arial"/>
-                        <a:buNone/>
-                      </a:pPr>
-                      <a:r>
-                        <a:rPr lang="ko-KR" altLang="en-US" sz="1700" b="0" u="none" strike="noStrike" cap="none" dirty="0" smtClean="0">
-                          <a:solidFill>
-                            <a:schemeClr val="dk1"/>
-                          </a:solidFill>
-                        </a:rPr>
-                        <a:t>화면코드</a:t>
-                      </a:r>
-                      <a:endParaRPr sz="1700" b="0" u="none" strike="noStrike" cap="none" dirty="0">
-                        <a:solidFill>
-                          <a:schemeClr val="dk1"/>
-                        </a:solidFill>
-                      </a:endParaRPr>
-                    </a:p>
-                  </a:txBody>
-                  <a:tcPr marL="74304" marR="74304" marT="45725" marB="45725" anchor="ctr">
-                    <a:lnL w="12700" cap="flat" cmpd="sng">
-                      <a:solidFill>
-                        <a:schemeClr val="dk1"/>
-                      </a:solidFill>
-                      <a:prstDash val="solid"/>
-                      <a:round/>
-                      <a:headEnd type="none" w="sm" len="sm"/>
-                      <a:tailEnd type="none" w="sm" len="sm"/>
-                    </a:lnL>
-                    <a:lnR w="12700" cap="flat" cmpd="sng">
-                      <a:solidFill>
-                        <a:schemeClr val="dk1"/>
-                      </a:solidFill>
-                      <a:prstDash val="solid"/>
-                      <a:round/>
-                      <a:headEnd type="none" w="sm" len="sm"/>
-                      <a:tailEnd type="none" w="sm" len="sm"/>
-                    </a:lnR>
-                    <a:lnT w="12700" cap="flat" cmpd="sng">
-                      <a:solidFill>
-                        <a:schemeClr val="dk1"/>
-                      </a:solidFill>
-                      <a:prstDash val="solid"/>
-                      <a:round/>
-                      <a:headEnd type="none" w="sm" len="sm"/>
-                      <a:tailEnd type="none" w="sm" len="sm"/>
-                    </a:lnT>
-                    <a:lnB w="12700" cap="flat" cmpd="sng" algn="ctr">
-                      <a:solidFill>
-                        <a:schemeClr val="dk1"/>
-                      </a:solidFill>
-                      <a:prstDash val="solid"/>
-                      <a:round/>
-                      <a:headEnd type="none" w="sm" len="sm"/>
-                      <a:tailEnd type="none" w="sm" len="sm"/>
-                    </a:lnB>
-                    <a:solidFill>
-                      <a:srgbClr val="D8D8D8"/>
-                    </a:solidFill>
-                  </a:tcPr>
-                </a:tc>
-              </a:tr>
-              <a:tr h="434794">
-                <a:tc>
-                  <a:txBody>
-                    <a:bodyPr/>
-                    <a:lstStyle/>
-                    <a:p>
-                      <a:pPr marL="0" marR="0" lvl="0" indent="0" algn="ctr" defTabSz="914400" rtl="0" eaLnBrk="1" fontAlgn="auto" latinLnBrk="1" hangingPunct="1">
-                        <a:lnSpc>
-                          <a:spcPct val="100000"/>
-                        </a:lnSpc>
-                        <a:spcBef>
-                          <a:spcPts val="0"/>
-                        </a:spcBef>
-                        <a:spcAft>
-                          <a:spcPts val="0"/>
-                        </a:spcAft>
-                        <a:buClrTx/>
-                        <a:buSzTx/>
-                        <a:buFontTx/>
-                        <a:buNone/>
-                        <a:tabLst/>
-                        <a:defRPr sz="1000" b="0">
-                          <a:solidFill>
-                            <a:srgbClr val="000000"/>
-                          </a:solidFill>
-                          <a:latin typeface="Arial"/>
-                          <a:ea typeface="Arial"/>
-                          <a:cs typeface="Arial"/>
-                          <a:sym typeface="Arial"/>
-                        </a:defRPr>
-                      </a:pPr>
-                      <a:r>
-                        <a:rPr lang="en-US" altLang="ko-KR" sz="1700" b="0" u="none" strike="noStrike" cap="none" dirty="0" err="1" smtClean="0">
-                          <a:solidFill>
-                            <a:schemeClr val="dk1"/>
-                          </a:solidFill>
-                        </a:rPr>
-                        <a:t>sh_user_m_semiDetail</a:t>
-                      </a:r>
-                      <a:endParaRPr lang="en-US" altLang="ko-KR" sz="1700" b="0" u="none" strike="noStrike" cap="none" dirty="0">
-                        <a:solidFill>
-                          <a:schemeClr val="dk1"/>
-                        </a:solidFill>
-                      </a:endParaRPr>
-                    </a:p>
-                  </a:txBody>
-                  <a:tcPr marL="74304" marR="74304" marT="45725" marB="45725" anchor="ctr">
-                    <a:lnL w="12700" cap="flat" cmpd="sng" algn="ctr">
-                      <a:solidFill>
-                        <a:schemeClr val="dk1"/>
-                      </a:solidFill>
-                      <a:prstDash val="solid"/>
-                      <a:round/>
-                      <a:headEnd type="none" w="sm" len="sm"/>
-                      <a:tailEnd type="none" w="sm" len="sm"/>
-                    </a:lnL>
-                    <a:lnR w="12700" cap="flat" cmpd="sng" algn="ctr">
-                      <a:solidFill>
-                        <a:schemeClr val="dk1"/>
-                      </a:solidFill>
-                      <a:prstDash val="solid"/>
-                      <a:round/>
-                      <a:headEnd type="none" w="sm" len="sm"/>
-                      <a:tailEnd type="none" w="sm" len="sm"/>
-                    </a:lnR>
-                    <a:lnT w="12700" cap="flat" cmpd="sng" algn="ctr">
-                      <a:solidFill>
-                        <a:schemeClr val="dk1"/>
-                      </a:solidFill>
-                      <a:prstDash val="solid"/>
-                      <a:round/>
-                      <a:headEnd type="none" w="sm" len="sm"/>
-                      <a:tailEnd type="none" w="sm" len="sm"/>
-                    </a:lnT>
-                    <a:lnB w="12700" cap="flat" cmpd="sng">
-                      <a:solidFill>
-                        <a:schemeClr val="dk1"/>
-                      </a:solidFill>
-                      <a:prstDash val="solid"/>
-                      <a:round/>
-                      <a:headEnd type="none" w="sm" len="sm"/>
-                      <a:tailEnd type="none" w="sm" len="sm"/>
-                    </a:lnB>
-                    <a:solidFill>
-                      <a:schemeClr val="bg1"/>
-                    </a:solidFill>
-                  </a:tcPr>
-                </a:tc>
-              </a:tr>
-            </a:tbl>
-          </a:graphicData>
-        </a:graphic>
-      </p:graphicFrame>
-      <p:sp>
-        <p:nvSpPr>
-          <p:cNvPr id="7" name="직사각형 6"/>
-          <p:cNvSpPr/>
-          <p:nvPr/>
-        </p:nvSpPr>
-        <p:spPr>
-          <a:xfrm>
-            <a:off x="114866" y="241014"/>
-            <a:ext cx="7765267" cy="477054"/>
-          </a:xfrm>
-          <a:prstGeom prst="rect">
-            <a:avLst/>
-          </a:prstGeom>
-        </p:spPr>
-        <p:txBody>
-          <a:bodyPr wrap="none">
-            <a:spAutoFit/>
-          </a:bodyPr>
-          <a:lstStyle/>
-          <a:p>
-            <a:pPr lvl="0">
-              <a:buClr>
-                <a:srgbClr val="000000"/>
-              </a:buClr>
-              <a:buSzPts val="1500"/>
-              <a:defRPr/>
-            </a:pPr>
-            <a:r>
-              <a:rPr lang="en-US" altLang="ko-KR" sz="2500" dirty="0" smtClean="0">
-                <a:solidFill>
-                  <a:schemeClr val="bg1"/>
-                </a:solidFill>
-                <a:latin typeface="+mj-lt"/>
-              </a:rPr>
-              <a:t>[</a:t>
-            </a:r>
-            <a:r>
-              <a:rPr lang="ko-KR" altLang="en-US" sz="2500" dirty="0" smtClean="0">
-                <a:solidFill>
-                  <a:schemeClr val="bg1"/>
-                </a:solidFill>
-                <a:latin typeface="+mj-lt"/>
-              </a:rPr>
-              <a:t>화면 설계</a:t>
-            </a:r>
-            <a:r>
-              <a:rPr lang="en-US" altLang="ko-KR" sz="2500" dirty="0" smtClean="0">
-                <a:solidFill>
-                  <a:schemeClr val="bg1"/>
-                </a:solidFill>
-                <a:latin typeface="+mj-lt"/>
-              </a:rPr>
-              <a:t>]</a:t>
-            </a:r>
-            <a:r>
-              <a:rPr lang="ko-KR" altLang="en-US" sz="2500" dirty="0">
-                <a:solidFill>
-                  <a:schemeClr val="bg1"/>
-                </a:solidFill>
-              </a:rPr>
-              <a:t> 사용자</a:t>
-            </a:r>
-            <a:r>
-              <a:rPr lang="en-US" altLang="ko-KR" sz="2500" dirty="0">
-                <a:solidFill>
-                  <a:schemeClr val="bg1"/>
-                </a:solidFill>
-              </a:rPr>
-              <a:t> - </a:t>
-            </a:r>
-            <a:r>
-              <a:rPr lang="ko-KR" altLang="en-US" sz="2500" dirty="0" err="1">
-                <a:solidFill>
-                  <a:schemeClr val="bg1"/>
-                </a:solidFill>
-              </a:rPr>
-              <a:t>모바일</a:t>
-            </a:r>
-            <a:r>
-              <a:rPr lang="ko-KR" altLang="en-US" sz="2500" dirty="0">
-                <a:solidFill>
-                  <a:schemeClr val="bg1"/>
-                </a:solidFill>
-              </a:rPr>
-              <a:t> </a:t>
-            </a:r>
-            <a:r>
-              <a:rPr lang="en-US" altLang="ko-KR" sz="2500" dirty="0" smtClean="0">
-                <a:solidFill>
-                  <a:schemeClr val="bg1"/>
-                </a:solidFill>
-                <a:latin typeface="+mj-lt"/>
-              </a:rPr>
-              <a:t>– </a:t>
-            </a:r>
-            <a:r>
-              <a:rPr lang="ko-KR" altLang="en-US" sz="2500" dirty="0" smtClean="0">
-                <a:solidFill>
-                  <a:schemeClr val="bg1"/>
-                </a:solidFill>
-                <a:latin typeface="+mj-lt"/>
-              </a:rPr>
-              <a:t>세미나 상세페이지 </a:t>
-            </a:r>
-            <a:r>
-              <a:rPr lang="en-US" altLang="ko-KR" sz="2500" dirty="0" smtClean="0">
-                <a:solidFill>
-                  <a:schemeClr val="bg1"/>
-                </a:solidFill>
-                <a:latin typeface="+mj-lt"/>
-              </a:rPr>
-              <a:t>- 3</a:t>
-            </a:r>
-            <a:endParaRPr lang="ko-KR" altLang="en-US" sz="2500" dirty="0">
-              <a:solidFill>
-                <a:schemeClr val="bg1"/>
-              </a:solidFill>
-              <a:latin typeface="+mj-lt"/>
-            </a:endParaRPr>
-          </a:p>
-        </p:txBody>
-      </p:sp>
-    </p:spTree>
-    <p:extLst>
-      <p:ext uri="{BB962C8B-B14F-4D97-AF65-F5344CB8AC3E}">
-        <p14:creationId xmlns:p14="http://schemas.microsoft.com/office/powerpoint/2010/main" val="3717876455"/>
-      </p:ext>
-    </p:extLst>
-  </p:cSld>
-  <p:clrMapOvr>
-    <a:masterClrMapping/>
-  </p:clrMapOvr>
-  <p:timing>
-    <p:tnLst>
-      <p:par>
-        <p:cTn id="1" dur="indefinite" restart="never" nodeType="tmRoot"/>
-      </p:par>
-    </p:tnLst>
-  </p:timing>
-</p:sld>
-</file>
-
-<file path=ppt/slides/slide18.xml><?xml version="1.0" encoding="utf-8"?>
 <p:sld xmlns:a="http://schemas.openxmlformats.org/drawingml/2006/main" xmlns:r="http://schemas.openxmlformats.org/officeDocument/2006/relationships" xmlns:p="http://schemas.openxmlformats.org/presentationml/2006/main">
   <p:cSld>
     <p:spTree>
@@ -10853,92 +9387,74 @@
                 </a:solidFill>
                 <a:latin typeface="+mj-lt"/>
               </a:rPr>
-              <a:t>화면 </a:t>
+              <a:t>화면 구현</a:t>
+            </a:r>
+            <a:r>
+              <a:rPr lang="en-US" altLang="ko-KR" sz="2500" dirty="0" smtClean="0">
+                <a:solidFill>
+                  <a:schemeClr val="bg1"/>
+                </a:solidFill>
+                <a:latin typeface="+mj-lt"/>
+              </a:rPr>
+              <a:t>]</a:t>
             </a:r>
             <a:r>
               <a:rPr lang="ko-KR" altLang="en-US" sz="2500" dirty="0" smtClean="0">
                 <a:solidFill>
                   <a:schemeClr val="bg1"/>
                 </a:solidFill>
+              </a:rPr>
+              <a:t> </a:t>
+            </a:r>
+            <a:r>
+              <a:rPr lang="ko-KR" altLang="en-US" sz="2500" dirty="0">
+                <a:solidFill>
+                  <a:schemeClr val="bg1"/>
+                </a:solidFill>
+              </a:rPr>
+              <a:t>사용자</a:t>
+            </a:r>
+            <a:r>
+              <a:rPr lang="en-US" altLang="ko-KR" sz="2500" dirty="0">
+                <a:solidFill>
+                  <a:schemeClr val="bg1"/>
+                </a:solidFill>
+              </a:rPr>
+              <a:t> - </a:t>
+            </a:r>
+            <a:r>
+              <a:rPr lang="ko-KR" altLang="en-US" sz="2500" dirty="0" err="1">
+                <a:solidFill>
+                  <a:schemeClr val="bg1"/>
+                </a:solidFill>
+              </a:rPr>
+              <a:t>모바일</a:t>
+            </a:r>
+            <a:r>
+              <a:rPr lang="ko-KR" altLang="en-US" sz="2500" dirty="0">
+                <a:solidFill>
+                  <a:schemeClr val="bg1"/>
+                </a:solidFill>
+              </a:rPr>
+              <a:t> </a:t>
+            </a:r>
+            <a:r>
+              <a:rPr lang="en-US" altLang="ko-KR" sz="2500" dirty="0" smtClean="0">
+                <a:solidFill>
+                  <a:schemeClr val="bg1"/>
+                </a:solidFill>
                 <a:latin typeface="+mj-lt"/>
               </a:rPr>
-              <a:t>구현</a:t>
-            </a:r>
-            <a:r>
-              <a:rPr lang="en-US" altLang="ko-KR" sz="2500" dirty="0" smtClean="0">
+              <a:t>– </a:t>
+            </a:r>
+            <a:r>
+              <a:rPr lang="ko-KR" altLang="en-US" sz="2500" dirty="0" smtClean="0">
                 <a:solidFill>
                   <a:schemeClr val="bg1"/>
                 </a:solidFill>
                 <a:latin typeface="+mj-lt"/>
               </a:rPr>
-              <a:t>]</a:t>
-            </a:r>
-            <a:r>
-              <a:rPr lang="ko-KR" altLang="en-US" sz="2500" dirty="0" smtClean="0">
-                <a:solidFill>
-                  <a:schemeClr val="bg1"/>
-                </a:solidFill>
-              </a:rPr>
-              <a:t> </a:t>
-            </a:r>
-            <a:r>
-              <a:rPr lang="ko-KR" altLang="en-US" sz="2500" dirty="0">
-                <a:solidFill>
-                  <a:schemeClr val="bg1"/>
-                </a:solidFill>
-              </a:rPr>
-              <a:t>사용자</a:t>
-            </a:r>
-            <a:r>
-              <a:rPr lang="en-US" altLang="ko-KR" sz="2500" dirty="0">
-                <a:solidFill>
-                  <a:schemeClr val="bg1"/>
-                </a:solidFill>
-              </a:rPr>
-              <a:t> - </a:t>
-            </a:r>
-            <a:r>
-              <a:rPr lang="ko-KR" altLang="en-US" sz="2500" dirty="0" err="1">
-                <a:solidFill>
-                  <a:schemeClr val="bg1"/>
-                </a:solidFill>
-              </a:rPr>
-              <a:t>모바일</a:t>
-            </a:r>
-            <a:r>
-              <a:rPr lang="ko-KR" altLang="en-US" sz="2500" dirty="0">
-                <a:solidFill>
-                  <a:schemeClr val="bg1"/>
-                </a:solidFill>
-              </a:rPr>
-              <a:t> </a:t>
-            </a:r>
-            <a:r>
-              <a:rPr lang="en-US" altLang="ko-KR" sz="2500" dirty="0" smtClean="0">
-                <a:solidFill>
-                  <a:schemeClr val="bg1"/>
-                </a:solidFill>
-                <a:latin typeface="+mj-lt"/>
-              </a:rPr>
-              <a:t>– </a:t>
-            </a:r>
-            <a:r>
-              <a:rPr lang="ko-KR" altLang="en-US" sz="2500" dirty="0" smtClean="0">
-                <a:solidFill>
-                  <a:schemeClr val="bg1"/>
-                </a:solidFill>
-                <a:latin typeface="+mj-lt"/>
-              </a:rPr>
-              <a:t>세미나 </a:t>
-            </a:r>
-            <a:r>
-              <a:rPr lang="ko-KR" altLang="en-US" sz="2500" dirty="0" smtClean="0">
-                <a:solidFill>
-                  <a:schemeClr val="bg1"/>
-                </a:solidFill>
-                <a:latin typeface="+mj-lt"/>
-              </a:rPr>
-              <a:t>상세페이지</a:t>
+              <a:t>세미나 상세페이지</a:t>
             </a:r>
             <a:endParaRPr lang="ko-KR" altLang="en-US" sz="2500" dirty="0">
               <a:solidFill>
@@ -10962,7 +9478,7 @@
 </p:sld>
 </file>
 
-<file path=ppt/slides/slide19.xml><?xml version="1.0" encoding="utf-8"?>
+<file path=ppt/slides/slide17.xml><?xml version="1.0" encoding="utf-8"?>
 <p:sld xmlns:a="http://schemas.openxmlformats.org/drawingml/2006/main" xmlns:r="http://schemas.openxmlformats.org/officeDocument/2006/relationships" xmlns:p="http://schemas.openxmlformats.org/presentationml/2006/main">
   <p:cSld>
     <p:spTree>
@@ -11003,14 +9519,14 @@
                 <a:gridCol w="342705">
                   <a:extLst>
                     <a:ext uri="{9D8B030D-6E8A-4147-A177-3AD203B41FA5}">
-                      <a16:colId xmlns="" xmlns:a16="http://schemas.microsoft.com/office/drawing/2014/main" val="20000"/>
+                      <a16:colId xmlns:a16="http://schemas.microsoft.com/office/drawing/2014/main" xmlns="" val="20000"/>
                     </a:ext>
                   </a:extLst>
                 </a:gridCol>
                 <a:gridCol w="3149108">
                   <a:extLst>
                     <a:ext uri="{9D8B030D-6E8A-4147-A177-3AD203B41FA5}">
-                      <a16:colId xmlns="" xmlns:a16="http://schemas.microsoft.com/office/drawing/2014/main" val="20001"/>
+                      <a16:colId xmlns:a16="http://schemas.microsoft.com/office/drawing/2014/main" xmlns="" val="20001"/>
                     </a:ext>
                   </a:extLst>
                 </a:gridCol>
@@ -11107,7 +9623,7 @@
                 </a:tc>
                 <a:extLst>
                   <a:ext uri="{0D108BD9-81ED-4DB2-BD59-A6C34878D82A}">
-                    <a16:rowId xmlns="" xmlns:a16="http://schemas.microsoft.com/office/drawing/2014/main" val="10000"/>
+                    <a16:rowId xmlns:a16="http://schemas.microsoft.com/office/drawing/2014/main" xmlns="" val="10000"/>
                   </a:ext>
                 </a:extLst>
               </a:tr>
@@ -11213,7 +9729,7 @@
                 </a:tc>
                 <a:extLst>
                   <a:ext uri="{0D108BD9-81ED-4DB2-BD59-A6C34878D82A}">
-                    <a16:rowId xmlns="" xmlns:a16="http://schemas.microsoft.com/office/drawing/2014/main" val="10001"/>
+                    <a16:rowId xmlns:a16="http://schemas.microsoft.com/office/drawing/2014/main" xmlns="" val="10001"/>
                   </a:ext>
                 </a:extLst>
               </a:tr>
@@ -11249,7 +9765,7 @@
                 <a:gridCol w="8032096">
                   <a:extLst>
                     <a:ext uri="{9D8B030D-6E8A-4147-A177-3AD203B41FA5}">
-                      <a16:colId xmlns="" xmlns:a16="http://schemas.microsoft.com/office/drawing/2014/main" val="20000"/>
+                      <a16:colId xmlns:a16="http://schemas.microsoft.com/office/drawing/2014/main" xmlns="" val="20000"/>
                     </a:ext>
                   </a:extLst>
                 </a:gridCol>
@@ -11316,7 +9832,7 @@
                 </a:tc>
                 <a:extLst>
                   <a:ext uri="{0D108BD9-81ED-4DB2-BD59-A6C34878D82A}">
-                    <a16:rowId xmlns="" xmlns:a16="http://schemas.microsoft.com/office/drawing/2014/main" val="10000"/>
+                    <a16:rowId xmlns:a16="http://schemas.microsoft.com/office/drawing/2014/main" xmlns="" val="10000"/>
                   </a:ext>
                 </a:extLst>
               </a:tr>
@@ -11639,7 +10155,7 @@
         <p:spPr>
           <a:xfrm>
             <a:off x="114866" y="241014"/>
-            <a:ext cx="7720383" cy="477054"/>
+            <a:ext cx="7266733" cy="477054"/>
           </a:xfrm>
           <a:prstGeom prst="rect">
             <a:avLst/>
@@ -11735,16 +10251,16 @@
                 </a:solidFill>
                 <a:latin typeface="+mj-lt"/>
               </a:rPr>
-              <a:t>세미나 결제 페이지</a:t>
-            </a:r>
-            <a:r>
-              <a:rPr lang="en-US" altLang="ko-KR" sz="2500" dirty="0" smtClean="0">
+              <a:t>세미나 결제 </a:t>
+            </a:r>
+            <a:r>
+              <a:rPr lang="ko-KR" altLang="en-US" sz="2500" dirty="0" smtClean="0">
                 <a:solidFill>
                   <a:schemeClr val="bg1"/>
                 </a:solidFill>
                 <a:latin typeface="+mj-lt"/>
               </a:rPr>
-              <a:t>– 1</a:t>
+              <a:t>페이지</a:t>
             </a:r>
             <a:endParaRPr lang="ko-KR" altLang="en-US" sz="2500" dirty="0">
               <a:solidFill>
@@ -11772,6 +10288,243 @@
       </p:par>
     </p:tnLst>
   </p:timing>
+</p:sld>
+</file>
+
+<file path=ppt/slides/slide18.xml><?xml version="1.0" encoding="utf-8"?>
+<p:sld xmlns:a="http://schemas.openxmlformats.org/drawingml/2006/main" xmlns:r="http://schemas.openxmlformats.org/officeDocument/2006/relationships" xmlns:p="http://schemas.openxmlformats.org/presentationml/2006/main">
+  <p:cSld>
+    <p:spTree>
+      <p:nvGrpSpPr>
+        <p:cNvPr id="1" name=""/>
+        <p:cNvGrpSpPr/>
+        <p:nvPr/>
+      </p:nvGrpSpPr>
+      <p:grpSpPr>
+        <a:xfrm>
+          <a:off x="0" y="0"/>
+          <a:ext cx="0" cy="0"/>
+          <a:chOff x="0" y="0"/>
+          <a:chExt cx="0" cy="0"/>
+        </a:xfrm>
+      </p:grpSpPr>
+      <p:pic>
+        <p:nvPicPr>
+          <p:cNvPr id="1026" name="Picture 2"/>
+          <p:cNvPicPr>
+            <a:picLocks noChangeAspect="1" noChangeArrowheads="1"/>
+          </p:cNvPicPr>
+          <p:nvPr/>
+        </p:nvPicPr>
+        <p:blipFill>
+          <a:blip r:embed="rId2">
+            <a:extLst>
+              <a:ext uri="{28A0092B-C50C-407E-A947-70E740481C1C}">
+                <a14:useLocalDpi xmlns:a14="http://schemas.microsoft.com/office/drawing/2010/main" val="0"/>
+              </a:ext>
+            </a:extLst>
+          </a:blip>
+          <a:srcRect/>
+          <a:stretch>
+            <a:fillRect/>
+          </a:stretch>
+        </p:blipFill>
+        <p:spPr bwMode="auto">
+          <a:xfrm>
+            <a:off x="4364428" y="1383955"/>
+            <a:ext cx="2825464" cy="5173364"/>
+          </a:xfrm>
+          <a:prstGeom prst="rect">
+            <a:avLst/>
+          </a:prstGeom>
+          <a:noFill/>
+          <a:ln>
+            <a:noFill/>
+          </a:ln>
+          <a:effectLst/>
+          <a:extLst>
+            <a:ext uri="{909E8E84-426E-40DD-AFC4-6F175D3DCCD1}">
+              <a14:hiddenFill xmlns:a14="http://schemas.microsoft.com/office/drawing/2010/main">
+                <a:solidFill>
+                  <a:schemeClr val="accent1"/>
+                </a:solidFill>
+              </a14:hiddenFill>
+            </a:ext>
+            <a:ext uri="{91240B29-F687-4F45-9708-019B960494DF}">
+              <a14:hiddenLine xmlns:a14="http://schemas.microsoft.com/office/drawing/2010/main" w="9525">
+                <a:solidFill>
+                  <a:schemeClr val="tx1"/>
+                </a:solidFill>
+                <a:miter lim="800000"/>
+                <a:headEnd/>
+                <a:tailEnd/>
+              </a14:hiddenLine>
+            </a:ext>
+            <a:ext uri="{AF507438-7753-43E0-B8FC-AC1667EBCBE1}">
+              <a14:hiddenEffects xmlns:a14="http://schemas.microsoft.com/office/drawing/2010/main">
+                <a:effectLst>
+                  <a:outerShdw dist="35921" dir="2700000" algn="ctr" rotWithShape="0">
+                    <a:schemeClr val="bg2"/>
+                  </a:outerShdw>
+                </a:effectLst>
+              </a14:hiddenEffects>
+            </a:ext>
+          </a:extLst>
+        </p:spPr>
+      </p:pic>
+      <p:sp>
+        <p:nvSpPr>
+          <p:cNvPr id="3" name="직사각형 2"/>
+          <p:cNvSpPr/>
+          <p:nvPr/>
+        </p:nvSpPr>
+        <p:spPr>
+          <a:xfrm>
+            <a:off x="114866" y="241014"/>
+            <a:ext cx="7266733" cy="477054"/>
+          </a:xfrm>
+          <a:prstGeom prst="rect">
+            <a:avLst/>
+          </a:prstGeom>
+        </p:spPr>
+        <p:txBody>
+          <a:bodyPr wrap="none">
+            <a:spAutoFit/>
+          </a:bodyPr>
+          <a:lstStyle/>
+          <a:p>
+            <a:pPr lvl="0">
+              <a:buClr>
+                <a:srgbClr val="000000"/>
+              </a:buClr>
+              <a:buSzPts val="1500"/>
+              <a:defRPr/>
+            </a:pPr>
+            <a:r>
+              <a:rPr lang="en-US" altLang="ko-KR" sz="2500" dirty="0" smtClean="0">
+                <a:solidFill>
+                  <a:schemeClr val="bg1"/>
+                </a:solidFill>
+                <a:latin typeface="+mj-lt"/>
+              </a:rPr>
+              <a:t>[</a:t>
+            </a:r>
+            <a:r>
+              <a:rPr lang="ko-KR" altLang="en-US" sz="2500" dirty="0" smtClean="0">
+                <a:solidFill>
+                  <a:schemeClr val="bg1"/>
+                </a:solidFill>
+                <a:latin typeface="+mj-lt"/>
+              </a:rPr>
+              <a:t>화면 </a:t>
+            </a:r>
+            <a:r>
+              <a:rPr lang="ko-KR" altLang="en-US" sz="2500" dirty="0" smtClean="0">
+                <a:solidFill>
+                  <a:schemeClr val="bg1"/>
+                </a:solidFill>
+                <a:latin typeface="+mj-lt"/>
+              </a:rPr>
+              <a:t>구</a:t>
+            </a:r>
+            <a:r>
+              <a:rPr lang="ko-KR" altLang="en-US" sz="2500" dirty="0">
+                <a:solidFill>
+                  <a:schemeClr val="bg1"/>
+                </a:solidFill>
+                <a:latin typeface="+mj-lt"/>
+              </a:rPr>
+              <a:t>현</a:t>
+            </a:r>
+            <a:r>
+              <a:rPr lang="en-US" altLang="ko-KR" sz="2500" dirty="0" smtClean="0">
+                <a:solidFill>
+                  <a:schemeClr val="bg1"/>
+                </a:solidFill>
+                <a:latin typeface="+mj-lt"/>
+              </a:rPr>
+              <a:t>]</a:t>
+            </a:r>
+            <a:r>
+              <a:rPr lang="ko-KR" altLang="en-US" sz="2500" dirty="0" smtClean="0">
+                <a:solidFill>
+                  <a:schemeClr val="bg1"/>
+                </a:solidFill>
+                <a:latin typeface="+mj-lt"/>
+              </a:rPr>
+              <a:t>사용자</a:t>
+            </a:r>
+            <a:r>
+              <a:rPr lang="en-US" altLang="ko-KR" sz="2500" dirty="0">
+                <a:solidFill>
+                  <a:schemeClr val="bg1"/>
+                </a:solidFill>
+              </a:rPr>
+              <a:t> – </a:t>
+            </a:r>
+            <a:r>
+              <a:rPr lang="ko-KR" altLang="en-US" sz="2500" dirty="0" err="1" smtClean="0">
+                <a:solidFill>
+                  <a:schemeClr val="bg1"/>
+                </a:solidFill>
+              </a:rPr>
+              <a:t>모바일</a:t>
+            </a:r>
+            <a:r>
+              <a:rPr lang="ko-KR" altLang="en-US" sz="2500" dirty="0" smtClean="0">
+                <a:solidFill>
+                  <a:schemeClr val="bg1"/>
+                </a:solidFill>
+                <a:latin typeface="+mj-lt"/>
+              </a:rPr>
+              <a:t> </a:t>
+            </a:r>
+            <a:r>
+              <a:rPr lang="en-US" altLang="ko-KR" sz="2500" dirty="0" smtClean="0">
+                <a:solidFill>
+                  <a:schemeClr val="bg1"/>
+                </a:solidFill>
+                <a:latin typeface="+mj-lt"/>
+              </a:rPr>
+              <a:t>– </a:t>
+            </a:r>
+            <a:r>
+              <a:rPr lang="ko-KR" altLang="en-US" sz="2500" dirty="0" smtClean="0">
+                <a:solidFill>
+                  <a:schemeClr val="bg1"/>
+                </a:solidFill>
+                <a:latin typeface="+mj-lt"/>
+              </a:rPr>
+              <a:t>세미나 결제 </a:t>
+            </a:r>
+            <a:r>
+              <a:rPr lang="ko-KR" altLang="en-US" sz="2500" dirty="0" smtClean="0">
+                <a:solidFill>
+                  <a:schemeClr val="bg1"/>
+                </a:solidFill>
+                <a:latin typeface="+mj-lt"/>
+              </a:rPr>
+              <a:t>페이지</a:t>
+            </a:r>
+            <a:endParaRPr lang="ko-KR" altLang="en-US" sz="2500" dirty="0">
+              <a:solidFill>
+                <a:schemeClr val="bg1"/>
+              </a:solidFill>
+              <a:latin typeface="+mj-lt"/>
+            </a:endParaRPr>
+          </a:p>
+        </p:txBody>
+      </p:sp>
+    </p:spTree>
+    <p:extLst>
+      <p:ext uri="{BB962C8B-B14F-4D97-AF65-F5344CB8AC3E}">
+        <p14:creationId xmlns:p14="http://schemas.microsoft.com/office/powerpoint/2010/main" val="2360628577"/>
+      </p:ext>
+    </p:extLst>
+  </p:cSld>
+  <p:clrMapOvr>
+    <a:masterClrMapping/>
+  </p:clrMapOvr>
 </p:sld>
 </file>
 
@@ -11820,7 +10573,7 @@
                 <a:gridCol w="8032096">
                   <a:extLst>
                     <a:ext uri="{9D8B030D-6E8A-4147-A177-3AD203B41FA5}">
-                      <a16:colId xmlns="" xmlns:a16="http://schemas.microsoft.com/office/drawing/2014/main" val="20000"/>
+                      <a16:colId xmlns:a16="http://schemas.microsoft.com/office/drawing/2014/main" xmlns="" val="20000"/>
                     </a:ext>
                   </a:extLst>
                 </a:gridCol>
@@ -11885,7 +10638,7 @@
                 </a:tc>
                 <a:extLst>
                   <a:ext uri="{0D108BD9-81ED-4DB2-BD59-A6C34878D82A}">
-                    <a16:rowId xmlns="" xmlns:a16="http://schemas.microsoft.com/office/drawing/2014/main" val="10000"/>
+                    <a16:rowId xmlns:a16="http://schemas.microsoft.com/office/drawing/2014/main" xmlns="" val="10000"/>
                   </a:ext>
                 </a:extLst>
               </a:tr>
@@ -11949,7 +10702,7 @@
                 </a:tc>
                 <a:extLst>
                   <a:ext uri="{0D108BD9-81ED-4DB2-BD59-A6C34878D82A}">
-                    <a16:rowId xmlns="" xmlns:a16="http://schemas.microsoft.com/office/drawing/2014/main" val="10001"/>
+                    <a16:rowId xmlns:a16="http://schemas.microsoft.com/office/drawing/2014/main" xmlns="" val="10001"/>
                   </a:ext>
                 </a:extLst>
               </a:tr>
@@ -12462,14 +11215,14 @@
                 <a:gridCol w="342705">
                   <a:extLst>
                     <a:ext uri="{9D8B030D-6E8A-4147-A177-3AD203B41FA5}">
-                      <a16:colId xmlns="" xmlns:a16="http://schemas.microsoft.com/office/drawing/2014/main" val="20000"/>
+                      <a16:colId xmlns:a16="http://schemas.microsoft.com/office/drawing/2014/main" xmlns="" val="20000"/>
                     </a:ext>
                   </a:extLst>
                 </a:gridCol>
                 <a:gridCol w="3149108">
                   <a:extLst>
                     <a:ext uri="{9D8B030D-6E8A-4147-A177-3AD203B41FA5}">
-                      <a16:colId xmlns="" xmlns:a16="http://schemas.microsoft.com/office/drawing/2014/main" val="20001"/>
+                      <a16:colId xmlns:a16="http://schemas.microsoft.com/office/drawing/2014/main" xmlns="" val="20001"/>
                     </a:ext>
                   </a:extLst>
                 </a:gridCol>
@@ -12566,7 +11319,7 @@
                 </a:tc>
                 <a:extLst>
                   <a:ext uri="{0D108BD9-81ED-4DB2-BD59-A6C34878D82A}">
-                    <a16:rowId xmlns="" xmlns:a16="http://schemas.microsoft.com/office/drawing/2014/main" val="10000"/>
+                    <a16:rowId xmlns:a16="http://schemas.microsoft.com/office/drawing/2014/main" xmlns="" val="10000"/>
                   </a:ext>
                 </a:extLst>
               </a:tr>
@@ -12682,7 +11435,7 @@
                 </a:tc>
                 <a:extLst>
                   <a:ext uri="{0D108BD9-81ED-4DB2-BD59-A6C34878D82A}">
-                    <a16:rowId xmlns="" xmlns:a16="http://schemas.microsoft.com/office/drawing/2014/main" val="10001"/>
+                    <a16:rowId xmlns:a16="http://schemas.microsoft.com/office/drawing/2014/main" xmlns="" val="10001"/>
                   </a:ext>
                 </a:extLst>
               </a:tr>
@@ -12855,7 +11608,7 @@
                 </a:tc>
                 <a:extLst>
                   <a:ext uri="{0D108BD9-81ED-4DB2-BD59-A6C34878D82A}">
-                    <a16:rowId xmlns="" xmlns:a16="http://schemas.microsoft.com/office/drawing/2014/main" val="10002"/>
+                    <a16:rowId xmlns:a16="http://schemas.microsoft.com/office/drawing/2014/main" xmlns="" val="10002"/>
                   </a:ext>
                 </a:extLst>
               </a:tr>
@@ -13179,14 +11932,14 @@
                 <a:gridCol w="611879">
                   <a:extLst>
                     <a:ext uri="{9D8B030D-6E8A-4147-A177-3AD203B41FA5}">
-                      <a16:colId xmlns="" xmlns:a16="http://schemas.microsoft.com/office/drawing/2014/main" val="20000"/>
+                      <a16:colId xmlns:a16="http://schemas.microsoft.com/office/drawing/2014/main" xmlns="" val="20000"/>
                     </a:ext>
                   </a:extLst>
                 </a:gridCol>
                 <a:gridCol w="1499571">
                   <a:extLst>
                     <a:ext uri="{9D8B030D-6E8A-4147-A177-3AD203B41FA5}">
-                      <a16:colId xmlns="" xmlns:a16="http://schemas.microsoft.com/office/drawing/2014/main" val="20001"/>
+                      <a16:colId xmlns:a16="http://schemas.microsoft.com/office/drawing/2014/main" xmlns="" val="20001"/>
                     </a:ext>
                   </a:extLst>
                 </a:gridCol>
@@ -13351,7 +12104,7 @@
                 </a:tc>
                 <a:extLst>
                   <a:ext uri="{0D108BD9-81ED-4DB2-BD59-A6C34878D82A}">
-                    <a16:rowId xmlns="" xmlns:a16="http://schemas.microsoft.com/office/drawing/2014/main" val="10000"/>
+                    <a16:rowId xmlns:a16="http://schemas.microsoft.com/office/drawing/2014/main" xmlns="" val="10000"/>
                   </a:ext>
                 </a:extLst>
               </a:tr>
@@ -13580,7 +12333,7 @@
                 </a:tc>
                 <a:extLst>
                   <a:ext uri="{0D108BD9-81ED-4DB2-BD59-A6C34878D82A}">
-                    <a16:rowId xmlns="" xmlns:a16="http://schemas.microsoft.com/office/drawing/2014/main" val="10001"/>
+                    <a16:rowId xmlns:a16="http://schemas.microsoft.com/office/drawing/2014/main" xmlns="" val="10001"/>
                   </a:ext>
                 </a:extLst>
               </a:tr>
@@ -13745,7 +12498,7 @@
                 </a:tc>
                 <a:extLst>
                   <a:ext uri="{0D108BD9-81ED-4DB2-BD59-A6C34878D82A}">
-                    <a16:rowId xmlns="" xmlns:a16="http://schemas.microsoft.com/office/drawing/2014/main" val="10002"/>
+                    <a16:rowId xmlns:a16="http://schemas.microsoft.com/office/drawing/2014/main" xmlns="" val="10002"/>
                   </a:ext>
                 </a:extLst>
               </a:tr>
@@ -13918,7 +12671,7 @@
                 </a:tc>
                 <a:extLst>
                   <a:ext uri="{0D108BD9-81ED-4DB2-BD59-A6C34878D82A}">
-                    <a16:rowId xmlns="" xmlns:a16="http://schemas.microsoft.com/office/drawing/2014/main" val="10003"/>
+                    <a16:rowId xmlns:a16="http://schemas.microsoft.com/office/drawing/2014/main" xmlns="" val="10003"/>
                   </a:ext>
                 </a:extLst>
               </a:tr>
@@ -14123,7 +12876,7 @@
                 </a:tc>
                 <a:extLst>
                   <a:ext uri="{0D108BD9-81ED-4DB2-BD59-A6C34878D82A}">
-                    <a16:rowId xmlns="" xmlns:a16="http://schemas.microsoft.com/office/drawing/2014/main" val="10004"/>
+                    <a16:rowId xmlns:a16="http://schemas.microsoft.com/office/drawing/2014/main" xmlns="" val="10004"/>
                   </a:ext>
                 </a:extLst>
               </a:tr>
@@ -14500,1484 +13253,6 @@
       </p:par>
     </p:tnLst>
   </p:timing>
-</p:sld>
-</file>
-
-<file path=ppt/slides/slide20.xml><?xml version="1.0" encoding="utf-8"?>
-<p:sld xmlns:a="http://schemas.openxmlformats.org/drawingml/2006/main" xmlns:r="http://schemas.openxmlformats.org/officeDocument/2006/relationships" xmlns:p="http://schemas.openxmlformats.org/presentationml/2006/main">
-  <p:cSld>
-    <p:spTree>
-      <p:nvGrpSpPr>
-        <p:cNvPr id="1" name=""/>
-        <p:cNvGrpSpPr/>
-        <p:nvPr/>
-      </p:nvGrpSpPr>
-      <p:grpSpPr>
-        <a:xfrm>
-          <a:off x="0" y="0"/>
-          <a:ext cx="0" cy="0"/>
-          <a:chOff x="0" y="0"/>
-          <a:chExt cx="0" cy="0"/>
-        </a:xfrm>
-      </p:grpSpPr>
-      <p:graphicFrame>
-        <p:nvGraphicFramePr>
-          <p:cNvPr id="99" name="표 13"/>
-          <p:cNvGraphicFramePr/>
-          <p:nvPr>
-            <p:extLst>
-              <p:ext uri="{D42A27DB-BD31-4B8C-83A1-F6EECF244321}">
-                <p14:modId xmlns:p14="http://schemas.microsoft.com/office/powerpoint/2010/main" val="2193860789"/>
-              </p:ext>
-            </p:extLst>
-          </p:nvPr>
-        </p:nvGraphicFramePr>
-        <p:xfrm>
-          <a:off x="8509686" y="2395541"/>
-          <a:ext cx="3491813" cy="1326453"/>
-        </p:xfrm>
-        <a:graphic>
-          <a:graphicData uri="http://schemas.openxmlformats.org/drawingml/2006/table">
-            <a:tbl>
-              <a:tblPr firstRow="1"/>
-              <a:tblGrid>
-                <a:gridCol w="342705">
-                  <a:extLst>
-                    <a:ext uri="{9D8B030D-6E8A-4147-A177-3AD203B41FA5}">
-                      <a16:colId xmlns="" xmlns:a16="http://schemas.microsoft.com/office/drawing/2014/main" val="20000"/>
-                    </a:ext>
-                  </a:extLst>
-                </a:gridCol>
-                <a:gridCol w="3149108">
-                  <a:extLst>
-                    <a:ext uri="{9D8B030D-6E8A-4147-A177-3AD203B41FA5}">
-                      <a16:colId xmlns="" xmlns:a16="http://schemas.microsoft.com/office/drawing/2014/main" val="20001"/>
-                    </a:ext>
-                  </a:extLst>
-                </a:gridCol>
-              </a:tblGrid>
-              <a:tr h="378460">
-                <a:tc>
-                  <a:txBody>
-                    <a:bodyPr/>
-                    <a:lstStyle/>
-                    <a:p>
-                      <a:pPr algn="ctr">
-                        <a:defRPr sz="1800" b="0">
-                          <a:solidFill>
-                            <a:srgbClr val="000000"/>
-                          </a:solidFill>
-                        </a:defRPr>
-                      </a:pPr>
-                      <a:r>
-                        <a:rPr sz="1500" b="1" dirty="0"/>
-                        <a:t>#</a:t>
-                      </a:r>
-                    </a:p>
-                  </a:txBody>
-                  <a:tcPr marL="45720" marR="45720" anchor="ctr" horzOverflow="overflow">
-                    <a:lnL w="12700">
-                      <a:solidFill>
-                        <a:srgbClr val="000000"/>
-                      </a:solidFill>
-                    </a:lnL>
-                    <a:lnR w="12700">
-                      <a:solidFill>
-                        <a:srgbClr val="000000"/>
-                      </a:solidFill>
-                    </a:lnR>
-                    <a:lnT w="12700">
-                      <a:solidFill>
-                        <a:srgbClr val="000000"/>
-                      </a:solidFill>
-                    </a:lnT>
-                    <a:lnB w="12700">
-                      <a:solidFill>
-                        <a:srgbClr val="000000"/>
-                      </a:solidFill>
-                    </a:lnB>
-                    <a:solidFill>
-                      <a:srgbClr val="D9D9D9"/>
-                    </a:solidFill>
-                  </a:tcPr>
-                </a:tc>
-                <a:tc>
-                  <a:txBody>
-                    <a:bodyPr/>
-                    <a:lstStyle/>
-                    <a:p>
-                      <a:pPr algn="ctr">
-                        <a:defRPr sz="1800" b="0">
-                          <a:solidFill>
-                            <a:srgbClr val="000000"/>
-                          </a:solidFill>
-                        </a:defRPr>
-                      </a:pPr>
-                      <a:r>
-                        <a:rPr sz="1500" b="1"/>
-                        <a:t>기능명</a:t>
-                      </a:r>
-                    </a:p>
-                  </a:txBody>
-                  <a:tcPr marL="45720" marR="45720" anchor="ctr" horzOverflow="overflow">
-                    <a:lnL w="12700">
-                      <a:solidFill>
-                        <a:srgbClr val="000000"/>
-                      </a:solidFill>
-                    </a:lnL>
-                    <a:lnR w="12700">
-                      <a:solidFill>
-                        <a:srgbClr val="000000"/>
-                      </a:solidFill>
-                    </a:lnR>
-                    <a:lnT w="12700">
-                      <a:solidFill>
-                        <a:srgbClr val="000000"/>
-                      </a:solidFill>
-                    </a:lnT>
-                    <a:lnB w="12700">
-                      <a:solidFill>
-                        <a:srgbClr val="000000"/>
-                      </a:solidFill>
-                    </a:lnB>
-                    <a:solidFill>
-                      <a:srgbClr val="D9D9D9"/>
-                    </a:solidFill>
-                  </a:tcPr>
-                </a:tc>
-                <a:extLst>
-                  <a:ext uri="{0D108BD9-81ED-4DB2-BD59-A6C34878D82A}">
-                    <a16:rowId xmlns="" xmlns:a16="http://schemas.microsoft.com/office/drawing/2014/main" val="10000"/>
-                  </a:ext>
-                </a:extLst>
-              </a:tr>
-              <a:tr h="947993">
-                <a:tc>
-                  <a:txBody>
-                    <a:bodyPr/>
-                    <a:lstStyle/>
-                    <a:p>
-                      <a:pPr algn="ctr">
-                        <a:defRPr sz="1800"/>
-                      </a:pPr>
-                      <a:r>
-                        <a:rPr sz="1500"/>
-                        <a:t>1</a:t>
-                      </a:r>
-                    </a:p>
-                  </a:txBody>
-                  <a:tcPr marL="45720" marR="45720" anchor="ctr" horzOverflow="overflow">
-                    <a:lnL w="12700">
-                      <a:solidFill>
-                        <a:srgbClr val="000000"/>
-                      </a:solidFill>
-                    </a:lnL>
-                    <a:lnR w="12700">
-                      <a:solidFill>
-                        <a:srgbClr val="000000"/>
-                      </a:solidFill>
-                    </a:lnR>
-                    <a:lnT w="12700">
-                      <a:solidFill>
-                        <a:srgbClr val="000000"/>
-                      </a:solidFill>
-                    </a:lnT>
-                    <a:lnB w="12700">
-                      <a:solidFill>
-                        <a:srgbClr val="000000"/>
-                      </a:solidFill>
-                    </a:lnB>
-                    <a:solidFill>
-                      <a:srgbClr val="FFFFFF"/>
-                    </a:solidFill>
-                  </a:tcPr>
-                </a:tc>
-                <a:tc>
-                  <a:txBody>
-                    <a:bodyPr/>
-                    <a:lstStyle/>
-                    <a:p>
-                      <a:pPr algn="l">
-                        <a:defRPr sz="1500"/>
-                      </a:pPr>
-                      <a:r>
-                        <a:rPr lang="ko-KR" altLang="en-US" dirty="0" smtClean="0"/>
-                        <a:t>주최자 정보 및 결제 예정 금액</a:t>
-                      </a:r>
-                      <a:endParaRPr lang="en-US" altLang="ko-KR" dirty="0" smtClean="0"/>
-                    </a:p>
-                    <a:p>
-                      <a:pPr algn="l">
-                        <a:defRPr sz="1500"/>
-                      </a:pPr>
-                      <a:r>
-                        <a:rPr lang="ko-KR" altLang="en-US" sz="1200" dirty="0" smtClean="0"/>
-                        <a:t>사용자에게 정보 제공</a:t>
-                      </a:r>
-                      <a:endParaRPr sz="1200" dirty="0"/>
-                    </a:p>
-                  </a:txBody>
-                  <a:tcPr marL="45720" marR="45720" horzOverflow="overflow">
-                    <a:lnL w="12700">
-                      <a:solidFill>
-                        <a:srgbClr val="000000"/>
-                      </a:solidFill>
-                    </a:lnL>
-                    <a:lnR w="12700">
-                      <a:solidFill>
-                        <a:srgbClr val="000000"/>
-                      </a:solidFill>
-                    </a:lnR>
-                    <a:lnT w="12700">
-                      <a:solidFill>
-                        <a:srgbClr val="000000"/>
-                      </a:solidFill>
-                    </a:lnT>
-                    <a:lnB w="12700">
-                      <a:solidFill>
-                        <a:srgbClr val="000000"/>
-                      </a:solidFill>
-                    </a:lnB>
-                    <a:solidFill>
-                      <a:srgbClr val="FFFFFF"/>
-                    </a:solidFill>
-                  </a:tcPr>
-                </a:tc>
-                <a:extLst>
-                  <a:ext uri="{0D108BD9-81ED-4DB2-BD59-A6C34878D82A}">
-                    <a16:rowId xmlns="" xmlns:a16="http://schemas.microsoft.com/office/drawing/2014/main" val="10001"/>
-                  </a:ext>
-                </a:extLst>
-              </a:tr>
-            </a:tbl>
-          </a:graphicData>
-        </a:graphic>
-      </p:graphicFrame>
-      <p:graphicFrame>
-        <p:nvGraphicFramePr>
-          <p:cNvPr id="9" name="표 8"/>
-          <p:cNvGraphicFramePr>
-            <a:graphicFrameLocks noGrp="1"/>
-          </p:cNvGraphicFramePr>
-          <p:nvPr>
-            <p:extLst>
-              <p:ext uri="{D42A27DB-BD31-4B8C-83A1-F6EECF244321}">
-                <p14:modId xmlns:p14="http://schemas.microsoft.com/office/powerpoint/2010/main" val="2458579130"/>
-              </p:ext>
-            </p:extLst>
-          </p:nvPr>
-        </p:nvGraphicFramePr>
-        <p:xfrm>
-          <a:off x="131601" y="1283516"/>
-          <a:ext cx="8032096" cy="5347943"/>
-        </p:xfrm>
-        <a:graphic>
-          <a:graphicData uri="http://schemas.openxmlformats.org/drawingml/2006/table">
-            <a:tbl>
-              <a:tblPr firstRow="1" bandRow="1">
-                <a:tableStyleId>{5C22544A-7EE6-4342-B048-85BDC9FD1C3A}</a:tableStyleId>
-              </a:tblPr>
-              <a:tblGrid>
-                <a:gridCol w="8032096">
-                  <a:extLst>
-                    <a:ext uri="{9D8B030D-6E8A-4147-A177-3AD203B41FA5}">
-                      <a16:colId xmlns="" xmlns:a16="http://schemas.microsoft.com/office/drawing/2014/main" val="20000"/>
-                    </a:ext>
-                  </a:extLst>
-                </a:gridCol>
-              </a:tblGrid>
-              <a:tr h="5347943">
-                <a:tc>
-                  <a:txBody>
-                    <a:bodyPr/>
-                    <a:lstStyle/>
-                    <a:p>
-                      <a:pPr latinLnBrk="1"/>
-                      <a:endParaRPr lang="ko-KR" altLang="en-US" dirty="0"/>
-                    </a:p>
-                  </a:txBody>
-                  <a:tcPr>
-                    <a:lnL w="12700" cap="flat" cmpd="sng" algn="ctr">
-                      <a:solidFill>
-                        <a:schemeClr val="tx1"/>
-                      </a:solidFill>
-                      <a:prstDash val="solid"/>
-                      <a:round/>
-                      <a:headEnd type="none" w="med" len="med"/>
-                      <a:tailEnd type="none" w="med" len="med"/>
-                    </a:lnL>
-                    <a:lnR w="12700" cap="flat" cmpd="sng" algn="ctr">
-                      <a:solidFill>
-                        <a:schemeClr val="tx1"/>
-                      </a:solidFill>
-                      <a:prstDash val="solid"/>
-                      <a:round/>
-                      <a:headEnd type="none" w="med" len="med"/>
-                      <a:tailEnd type="none" w="med" len="med"/>
-                    </a:lnR>
-                    <a:lnT w="12700" cap="flat" cmpd="sng" algn="ctr">
-                      <a:solidFill>
-                        <a:schemeClr val="tx1"/>
-                      </a:solidFill>
-                      <a:prstDash val="solid"/>
-                      <a:round/>
-                      <a:headEnd type="none" w="med" len="med"/>
-                      <a:tailEnd type="none" w="med" len="med"/>
-                    </a:lnT>
-                    <a:lnB w="12700" cap="flat" cmpd="sng" algn="ctr">
-                      <a:solidFill>
-                        <a:schemeClr val="tx1"/>
-                      </a:solidFill>
-                      <a:prstDash val="solid"/>
-                      <a:round/>
-                      <a:headEnd type="none" w="med" len="med"/>
-                      <a:tailEnd type="none" w="med" len="med"/>
-                    </a:lnB>
-                    <a:lnTlToBr w="12700" cmpd="sng">
-                      <a:noFill/>
-                      <a:prstDash val="solid"/>
-                    </a:lnTlToBr>
-                    <a:lnBlToTr w="12700" cmpd="sng">
-                      <a:noFill/>
-                      <a:prstDash val="solid"/>
-                    </a:lnBlToTr>
-                    <a:solidFill>
-                      <a:schemeClr val="bg1"/>
-                    </a:solidFill>
-                  </a:tcPr>
-                </a:tc>
-                <a:extLst>
-                  <a:ext uri="{0D108BD9-81ED-4DB2-BD59-A6C34878D82A}">
-                    <a16:rowId xmlns="" xmlns:a16="http://schemas.microsoft.com/office/drawing/2014/main" val="10000"/>
-                  </a:ext>
-                </a:extLst>
-              </a:tr>
-            </a:tbl>
-          </a:graphicData>
-        </a:graphic>
-      </p:graphicFrame>
-      <p:pic>
-        <p:nvPicPr>
-          <p:cNvPr id="2" name="그림 1"/>
-          <p:cNvPicPr>
-            <a:picLocks noChangeAspect="1"/>
-          </p:cNvPicPr>
-          <p:nvPr/>
-        </p:nvPicPr>
-        <p:blipFill>
-          <a:blip r:embed="rId2"/>
-          <a:stretch>
-            <a:fillRect/>
-          </a:stretch>
-        </p:blipFill>
-        <p:spPr>
-          <a:xfrm>
-            <a:off x="2928683" y="1442887"/>
-            <a:ext cx="2290881" cy="5029200"/>
-          </a:xfrm>
-          <a:prstGeom prst="rect">
-            <a:avLst/>
-          </a:prstGeom>
-        </p:spPr>
-      </p:pic>
-      <p:graphicFrame>
-        <p:nvGraphicFramePr>
-          <p:cNvPr id="10" name="표 9"/>
-          <p:cNvGraphicFramePr>
-            <a:graphicFrameLocks noGrp="1"/>
-          </p:cNvGraphicFramePr>
-          <p:nvPr>
-            <p:extLst>
-              <p:ext uri="{D42A27DB-BD31-4B8C-83A1-F6EECF244321}">
-                <p14:modId xmlns:p14="http://schemas.microsoft.com/office/powerpoint/2010/main" val="887983929"/>
-              </p:ext>
-            </p:extLst>
-          </p:nvPr>
-        </p:nvGraphicFramePr>
-        <p:xfrm>
-          <a:off x="8509686" y="1273691"/>
-          <a:ext cx="3491813" cy="849860"/>
-        </p:xfrm>
-        <a:graphic>
-          <a:graphicData uri="http://schemas.openxmlformats.org/drawingml/2006/table">
-            <a:tbl>
-              <a:tblPr firstRow="1" bandRow="1">
-                <a:noFill/>
-              </a:tblPr>
-              <a:tblGrid>
-                <a:gridCol w="3491813"/>
-              </a:tblGrid>
-              <a:tr h="415066">
-                <a:tc>
-                  <a:txBody>
-                    <a:bodyPr/>
-                    <a:lstStyle/>
-                    <a:p>
-                      <a:pPr marL="0" marR="0" lvl="0" indent="0" algn="ctr" rtl="0">
-                        <a:lnSpc>
-                          <a:spcPct val="100000"/>
-                        </a:lnSpc>
-                        <a:spcBef>
-                          <a:spcPts val="0"/>
-                        </a:spcBef>
-                        <a:spcAft>
-                          <a:spcPts val="0"/>
-                        </a:spcAft>
-                        <a:buClr>
-                          <a:srgbClr val="000000"/>
-                        </a:buClr>
-                        <a:buSzPts val="1500"/>
-                        <a:buFont typeface="Arial"/>
-                        <a:buNone/>
-                      </a:pPr>
-                      <a:r>
-                        <a:rPr lang="ko-KR" altLang="en-US" sz="1700" b="0" u="none" strike="noStrike" cap="none" dirty="0" smtClean="0">
-                          <a:solidFill>
-                            <a:schemeClr val="dk1"/>
-                          </a:solidFill>
-                        </a:rPr>
-                        <a:t>화면코드</a:t>
-                      </a:r>
-                      <a:endParaRPr sz="1700" b="0" u="none" strike="noStrike" cap="none" dirty="0">
-                        <a:solidFill>
-                          <a:schemeClr val="dk1"/>
-                        </a:solidFill>
-                      </a:endParaRPr>
-                    </a:p>
-                  </a:txBody>
-                  <a:tcPr marL="74304" marR="74304" marT="45725" marB="45725" anchor="ctr">
-                    <a:lnL w="12700" cap="flat" cmpd="sng">
-                      <a:solidFill>
-                        <a:schemeClr val="dk1"/>
-                      </a:solidFill>
-                      <a:prstDash val="solid"/>
-                      <a:round/>
-                      <a:headEnd type="none" w="sm" len="sm"/>
-                      <a:tailEnd type="none" w="sm" len="sm"/>
-                    </a:lnL>
-                    <a:lnR w="12700" cap="flat" cmpd="sng">
-                      <a:solidFill>
-                        <a:schemeClr val="dk1"/>
-                      </a:solidFill>
-                      <a:prstDash val="solid"/>
-                      <a:round/>
-                      <a:headEnd type="none" w="sm" len="sm"/>
-                      <a:tailEnd type="none" w="sm" len="sm"/>
-                    </a:lnR>
-                    <a:lnT w="12700" cap="flat" cmpd="sng">
-                      <a:solidFill>
-                        <a:schemeClr val="dk1"/>
-                      </a:solidFill>
-                      <a:prstDash val="solid"/>
-                      <a:round/>
-                      <a:headEnd type="none" w="sm" len="sm"/>
-                      <a:tailEnd type="none" w="sm" len="sm"/>
-                    </a:lnT>
-                    <a:lnB w="12700" cap="flat" cmpd="sng" algn="ctr">
-                      <a:solidFill>
-                        <a:schemeClr val="dk1"/>
-                      </a:solidFill>
-                      <a:prstDash val="solid"/>
-                      <a:round/>
-                      <a:headEnd type="none" w="sm" len="sm"/>
-                      <a:tailEnd type="none" w="sm" len="sm"/>
-                    </a:lnB>
-                    <a:solidFill>
-                      <a:srgbClr val="D8D8D8"/>
-                    </a:solidFill>
-                  </a:tcPr>
-                </a:tc>
-              </a:tr>
-              <a:tr h="434794">
-                <a:tc>
-                  <a:txBody>
-                    <a:bodyPr/>
-                    <a:lstStyle/>
-                    <a:p>
-                      <a:pPr marL="0" marR="0" lvl="0" indent="0" algn="ctr" defTabSz="914400" rtl="0" eaLnBrk="1" fontAlgn="auto" latinLnBrk="1" hangingPunct="1">
-                        <a:lnSpc>
-                          <a:spcPct val="100000"/>
-                        </a:lnSpc>
-                        <a:spcBef>
-                          <a:spcPts val="0"/>
-                        </a:spcBef>
-                        <a:spcAft>
-                          <a:spcPts val="0"/>
-                        </a:spcAft>
-                        <a:buClrTx/>
-                        <a:buSzTx/>
-                        <a:buFontTx/>
-                        <a:buNone/>
-                        <a:tabLst/>
-                        <a:defRPr sz="1000" b="0">
-                          <a:solidFill>
-                            <a:srgbClr val="000000"/>
-                          </a:solidFill>
-                          <a:latin typeface="Arial"/>
-                          <a:ea typeface="Arial"/>
-                          <a:cs typeface="Arial"/>
-                          <a:sym typeface="Arial"/>
-                        </a:defRPr>
-                      </a:pPr>
-                      <a:r>
-                        <a:rPr lang="en-US" altLang="ko-KR" sz="1800" b="0" u="none" strike="noStrike" cap="none" dirty="0" err="1" smtClean="0">
-                          <a:solidFill>
-                            <a:schemeClr val="dk1"/>
-                          </a:solidFill>
-                        </a:rPr>
-                        <a:t>sh_user_m_semiPay</a:t>
-                      </a:r>
-                      <a:endParaRPr lang="en-US" altLang="ko-KR" sz="1800" b="0" u="none" strike="noStrike" cap="none" dirty="0">
-                        <a:solidFill>
-                          <a:schemeClr val="dk1"/>
-                        </a:solidFill>
-                      </a:endParaRPr>
-                    </a:p>
-                  </a:txBody>
-                  <a:tcPr marL="74304" marR="74304" marT="45725" marB="45725" anchor="ctr">
-                    <a:lnL w="12700" cap="flat" cmpd="sng" algn="ctr">
-                      <a:solidFill>
-                        <a:schemeClr val="dk1"/>
-                      </a:solidFill>
-                      <a:prstDash val="solid"/>
-                      <a:round/>
-                      <a:headEnd type="none" w="sm" len="sm"/>
-                      <a:tailEnd type="none" w="sm" len="sm"/>
-                    </a:lnL>
-                    <a:lnR w="12700" cap="flat" cmpd="sng" algn="ctr">
-                      <a:solidFill>
-                        <a:schemeClr val="dk1"/>
-                      </a:solidFill>
-                      <a:prstDash val="solid"/>
-                      <a:round/>
-                      <a:headEnd type="none" w="sm" len="sm"/>
-                      <a:tailEnd type="none" w="sm" len="sm"/>
-                    </a:lnR>
-                    <a:lnT w="12700" cap="flat" cmpd="sng" algn="ctr">
-                      <a:solidFill>
-                        <a:schemeClr val="dk1"/>
-                      </a:solidFill>
-                      <a:prstDash val="solid"/>
-                      <a:round/>
-                      <a:headEnd type="none" w="sm" len="sm"/>
-                      <a:tailEnd type="none" w="sm" len="sm"/>
-                    </a:lnT>
-                    <a:lnB w="12700" cap="flat" cmpd="sng">
-                      <a:solidFill>
-                        <a:schemeClr val="dk1"/>
-                      </a:solidFill>
-                      <a:prstDash val="solid"/>
-                      <a:round/>
-                      <a:headEnd type="none" w="sm" len="sm"/>
-                      <a:tailEnd type="none" w="sm" len="sm"/>
-                    </a:lnB>
-                    <a:solidFill>
-                      <a:schemeClr val="bg1"/>
-                    </a:solidFill>
-                  </a:tcPr>
-                </a:tc>
-              </a:tr>
-            </a:tbl>
-          </a:graphicData>
-        </a:graphic>
-      </p:graphicFrame>
-      <p:sp>
-        <p:nvSpPr>
-          <p:cNvPr id="7" name="직사각형 6"/>
-          <p:cNvSpPr/>
-          <p:nvPr/>
-        </p:nvSpPr>
-        <p:spPr>
-          <a:xfrm>
-            <a:off x="114866" y="241014"/>
-            <a:ext cx="7720383" cy="477054"/>
-          </a:xfrm>
-          <a:prstGeom prst="rect">
-            <a:avLst/>
-          </a:prstGeom>
-        </p:spPr>
-        <p:txBody>
-          <a:bodyPr wrap="none">
-            <a:spAutoFit/>
-          </a:bodyPr>
-          <a:lstStyle/>
-          <a:p>
-            <a:pPr lvl="0">
-              <a:buClr>
-                <a:srgbClr val="000000"/>
-              </a:buClr>
-              <a:buSzPts val="1500"/>
-              <a:defRPr/>
-            </a:pPr>
-            <a:r>
-              <a:rPr lang="en-US" altLang="ko-KR" sz="2500" dirty="0" smtClean="0">
-                <a:solidFill>
-                  <a:schemeClr val="bg1"/>
-                </a:solidFill>
-                <a:latin typeface="+mj-lt"/>
-              </a:rPr>
-              <a:t>[</a:t>
-            </a:r>
-            <a:r>
-              <a:rPr lang="ko-KR" altLang="en-US" sz="2500" dirty="0" smtClean="0">
-                <a:solidFill>
-                  <a:schemeClr val="bg1"/>
-                </a:solidFill>
-                <a:latin typeface="+mj-lt"/>
-              </a:rPr>
-              <a:t>화면 설계</a:t>
-            </a:r>
-            <a:r>
-              <a:rPr lang="en-US" altLang="ko-KR" sz="2500" dirty="0" smtClean="0">
-                <a:solidFill>
-                  <a:schemeClr val="bg1"/>
-                </a:solidFill>
-                <a:latin typeface="+mj-lt"/>
-              </a:rPr>
-              <a:t>]</a:t>
-            </a:r>
-            <a:r>
-              <a:rPr lang="ko-KR" altLang="en-US" sz="2500" dirty="0" smtClean="0">
-                <a:solidFill>
-                  <a:schemeClr val="bg1"/>
-                </a:solidFill>
-                <a:latin typeface="+mj-lt"/>
-              </a:rPr>
-              <a:t>사용자</a:t>
-            </a:r>
-            <a:r>
-              <a:rPr lang="en-US" altLang="ko-KR" sz="2500" dirty="0">
-                <a:solidFill>
-                  <a:schemeClr val="bg1"/>
-                </a:solidFill>
-              </a:rPr>
-              <a:t> – </a:t>
-            </a:r>
-            <a:r>
-              <a:rPr lang="ko-KR" altLang="en-US" sz="2500" dirty="0" err="1">
-                <a:solidFill>
-                  <a:schemeClr val="bg1"/>
-                </a:solidFill>
-              </a:rPr>
-              <a:t>모바일</a:t>
-            </a:r>
-            <a:r>
-              <a:rPr lang="ko-KR" altLang="en-US" sz="2500" dirty="0">
-                <a:solidFill>
-                  <a:schemeClr val="bg1"/>
-                </a:solidFill>
-              </a:rPr>
-              <a:t> </a:t>
-            </a:r>
-            <a:r>
-              <a:rPr lang="en-US" altLang="ko-KR" sz="2500" dirty="0" smtClean="0">
-                <a:solidFill>
-                  <a:schemeClr val="bg1"/>
-                </a:solidFill>
-                <a:latin typeface="+mj-lt"/>
-              </a:rPr>
-              <a:t>– </a:t>
-            </a:r>
-            <a:r>
-              <a:rPr lang="ko-KR" altLang="en-US" sz="2500" dirty="0" smtClean="0">
-                <a:solidFill>
-                  <a:schemeClr val="bg1"/>
-                </a:solidFill>
-                <a:latin typeface="+mj-lt"/>
-              </a:rPr>
-              <a:t>세미나 결제 페이지</a:t>
-            </a:r>
-            <a:r>
-              <a:rPr lang="en-US" altLang="ko-KR" sz="2500" dirty="0" smtClean="0">
-                <a:solidFill>
-                  <a:schemeClr val="bg1"/>
-                </a:solidFill>
-                <a:latin typeface="+mj-lt"/>
-              </a:rPr>
-              <a:t>– 2</a:t>
-            </a:r>
-            <a:endParaRPr lang="ko-KR" altLang="en-US" sz="2500" dirty="0">
-              <a:solidFill>
-                <a:schemeClr val="bg1"/>
-              </a:solidFill>
-              <a:latin typeface="+mj-lt"/>
-            </a:endParaRPr>
-          </a:p>
-        </p:txBody>
-      </p:sp>
-    </p:spTree>
-    <p:extLst>
-      <p:ext uri="{BB962C8B-B14F-4D97-AF65-F5344CB8AC3E}">
-        <p14:creationId xmlns:p14="http://schemas.microsoft.com/office/powerpoint/2010/main" val="686472062"/>
-      </p:ext>
-    </p:extLst>
-  </p:cSld>
-  <p:clrMapOvr>
-    <a:masterClrMapping/>
-  </p:clrMapOvr>
-  <p:timing>
-    <p:tnLst>
-      <p:par>
-        <p:cTn id="1" dur="indefinite" restart="never" nodeType="tmRoot"/>
-      </p:par>
-    </p:tnLst>
-  </p:timing>
-</p:sld>
-</file>
-
-<file path=ppt/slides/slide21.xml><?xml version="1.0" encoding="utf-8"?>
-<p:sld xmlns:a="http://schemas.openxmlformats.org/drawingml/2006/main" xmlns:r="http://schemas.openxmlformats.org/officeDocument/2006/relationships" xmlns:p="http://schemas.openxmlformats.org/presentationml/2006/main">
-  <p:cSld>
-    <p:spTree>
-      <p:nvGrpSpPr>
-        <p:cNvPr id="1" name=""/>
-        <p:cNvGrpSpPr/>
-        <p:nvPr/>
-      </p:nvGrpSpPr>
-      <p:grpSpPr>
-        <a:xfrm>
-          <a:off x="0" y="0"/>
-          <a:ext cx="0" cy="0"/>
-          <a:chOff x="0" y="0"/>
-          <a:chExt cx="0" cy="0"/>
-        </a:xfrm>
-      </p:grpSpPr>
-      <p:graphicFrame>
-        <p:nvGraphicFramePr>
-          <p:cNvPr id="99" name="표 13"/>
-          <p:cNvGraphicFramePr/>
-          <p:nvPr>
-            <p:extLst>
-              <p:ext uri="{D42A27DB-BD31-4B8C-83A1-F6EECF244321}">
-                <p14:modId xmlns:p14="http://schemas.microsoft.com/office/powerpoint/2010/main" val="1491146161"/>
-              </p:ext>
-            </p:extLst>
-          </p:nvPr>
-        </p:nvGraphicFramePr>
-        <p:xfrm>
-          <a:off x="8493211" y="2405366"/>
-          <a:ext cx="3491813" cy="1326453"/>
-        </p:xfrm>
-        <a:graphic>
-          <a:graphicData uri="http://schemas.openxmlformats.org/drawingml/2006/table">
-            <a:tbl>
-              <a:tblPr firstRow="1"/>
-              <a:tblGrid>
-                <a:gridCol w="342705">
-                  <a:extLst>
-                    <a:ext uri="{9D8B030D-6E8A-4147-A177-3AD203B41FA5}">
-                      <a16:colId xmlns="" xmlns:a16="http://schemas.microsoft.com/office/drawing/2014/main" val="20000"/>
-                    </a:ext>
-                  </a:extLst>
-                </a:gridCol>
-                <a:gridCol w="3149108">
-                  <a:extLst>
-                    <a:ext uri="{9D8B030D-6E8A-4147-A177-3AD203B41FA5}">
-                      <a16:colId xmlns="" xmlns:a16="http://schemas.microsoft.com/office/drawing/2014/main" val="20001"/>
-                    </a:ext>
-                  </a:extLst>
-                </a:gridCol>
-              </a:tblGrid>
-              <a:tr h="378460">
-                <a:tc>
-                  <a:txBody>
-                    <a:bodyPr/>
-                    <a:lstStyle/>
-                    <a:p>
-                      <a:pPr algn="ctr">
-                        <a:defRPr sz="1800" b="0">
-                          <a:solidFill>
-                            <a:srgbClr val="000000"/>
-                          </a:solidFill>
-                        </a:defRPr>
-                      </a:pPr>
-                      <a:r>
-                        <a:rPr sz="1500" b="1" dirty="0"/>
-                        <a:t>#</a:t>
-                      </a:r>
-                    </a:p>
-                  </a:txBody>
-                  <a:tcPr marL="45720" marR="45720" anchor="ctr" horzOverflow="overflow">
-                    <a:lnL w="12700">
-                      <a:solidFill>
-                        <a:srgbClr val="000000"/>
-                      </a:solidFill>
-                    </a:lnL>
-                    <a:lnR w="12700">
-                      <a:solidFill>
-                        <a:srgbClr val="000000"/>
-                      </a:solidFill>
-                    </a:lnR>
-                    <a:lnT w="12700">
-                      <a:solidFill>
-                        <a:srgbClr val="000000"/>
-                      </a:solidFill>
-                    </a:lnT>
-                    <a:lnB w="12700">
-                      <a:solidFill>
-                        <a:srgbClr val="000000"/>
-                      </a:solidFill>
-                    </a:lnB>
-                    <a:solidFill>
-                      <a:srgbClr val="D9D9D9"/>
-                    </a:solidFill>
-                  </a:tcPr>
-                </a:tc>
-                <a:tc>
-                  <a:txBody>
-                    <a:bodyPr/>
-                    <a:lstStyle/>
-                    <a:p>
-                      <a:pPr algn="ctr">
-                        <a:defRPr sz="1800" b="0">
-                          <a:solidFill>
-                            <a:srgbClr val="000000"/>
-                          </a:solidFill>
-                        </a:defRPr>
-                      </a:pPr>
-                      <a:r>
-                        <a:rPr sz="1500" b="1"/>
-                        <a:t>기능명</a:t>
-                      </a:r>
-                    </a:p>
-                  </a:txBody>
-                  <a:tcPr marL="45720" marR="45720" anchor="ctr" horzOverflow="overflow">
-                    <a:lnL w="12700">
-                      <a:solidFill>
-                        <a:srgbClr val="000000"/>
-                      </a:solidFill>
-                    </a:lnL>
-                    <a:lnR w="12700">
-                      <a:solidFill>
-                        <a:srgbClr val="000000"/>
-                      </a:solidFill>
-                    </a:lnR>
-                    <a:lnT w="12700">
-                      <a:solidFill>
-                        <a:srgbClr val="000000"/>
-                      </a:solidFill>
-                    </a:lnT>
-                    <a:lnB w="12700">
-                      <a:solidFill>
-                        <a:srgbClr val="000000"/>
-                      </a:solidFill>
-                    </a:lnB>
-                    <a:solidFill>
-                      <a:srgbClr val="D9D9D9"/>
-                    </a:solidFill>
-                  </a:tcPr>
-                </a:tc>
-                <a:extLst>
-                  <a:ext uri="{0D108BD9-81ED-4DB2-BD59-A6C34878D82A}">
-                    <a16:rowId xmlns="" xmlns:a16="http://schemas.microsoft.com/office/drawing/2014/main" val="10000"/>
-                  </a:ext>
-                </a:extLst>
-              </a:tr>
-              <a:tr h="947993">
-                <a:tc>
-                  <a:txBody>
-                    <a:bodyPr/>
-                    <a:lstStyle/>
-                    <a:p>
-                      <a:pPr algn="ctr">
-                        <a:defRPr sz="1800"/>
-                      </a:pPr>
-                      <a:r>
-                        <a:rPr sz="1500"/>
-                        <a:t>1</a:t>
-                      </a:r>
-                    </a:p>
-                  </a:txBody>
-                  <a:tcPr marL="45720" marR="45720" anchor="ctr" horzOverflow="overflow">
-                    <a:lnL w="12700">
-                      <a:solidFill>
-                        <a:srgbClr val="000000"/>
-                      </a:solidFill>
-                    </a:lnL>
-                    <a:lnR w="12700">
-                      <a:solidFill>
-                        <a:srgbClr val="000000"/>
-                      </a:solidFill>
-                    </a:lnR>
-                    <a:lnT w="12700">
-                      <a:solidFill>
-                        <a:srgbClr val="000000"/>
-                      </a:solidFill>
-                    </a:lnT>
-                    <a:lnB w="12700">
-                      <a:solidFill>
-                        <a:srgbClr val="000000"/>
-                      </a:solidFill>
-                    </a:lnB>
-                    <a:solidFill>
-                      <a:srgbClr val="FFFFFF"/>
-                    </a:solidFill>
-                  </a:tcPr>
-                </a:tc>
-                <a:tc>
-                  <a:txBody>
-                    <a:bodyPr/>
-                    <a:lstStyle/>
-                    <a:p>
-                      <a:pPr algn="l">
-                        <a:defRPr sz="1500"/>
-                      </a:pPr>
-                      <a:r>
-                        <a:rPr lang="ko-KR" altLang="en-US" sz="1200" dirty="0" smtClean="0"/>
-                        <a:t>서비스 동의</a:t>
-                      </a:r>
-                      <a:endParaRPr lang="en-US" altLang="ko-KR" sz="1200" dirty="0" smtClean="0"/>
-                    </a:p>
-                    <a:p>
-                      <a:pPr algn="l">
-                        <a:defRPr sz="1500"/>
-                      </a:pPr>
-                      <a:r>
-                        <a:rPr lang="en-US" sz="1200" dirty="0" smtClean="0"/>
-                        <a:t>-</a:t>
-                      </a:r>
-                      <a:r>
-                        <a:rPr lang="ko-KR" altLang="en-US" sz="1200" dirty="0" smtClean="0"/>
-                        <a:t>서비스 동의 및 신청 버튼</a:t>
-                      </a:r>
-                      <a:endParaRPr sz="1200" dirty="0"/>
-                    </a:p>
-                  </a:txBody>
-                  <a:tcPr marL="45720" marR="45720" horzOverflow="overflow">
-                    <a:lnL w="12700">
-                      <a:solidFill>
-                        <a:srgbClr val="000000"/>
-                      </a:solidFill>
-                    </a:lnL>
-                    <a:lnR w="12700">
-                      <a:solidFill>
-                        <a:srgbClr val="000000"/>
-                      </a:solidFill>
-                    </a:lnR>
-                    <a:lnT w="12700">
-                      <a:solidFill>
-                        <a:srgbClr val="000000"/>
-                      </a:solidFill>
-                    </a:lnT>
-                    <a:lnB w="12700">
-                      <a:solidFill>
-                        <a:srgbClr val="000000"/>
-                      </a:solidFill>
-                    </a:lnB>
-                    <a:solidFill>
-                      <a:srgbClr val="FFFFFF"/>
-                    </a:solidFill>
-                  </a:tcPr>
-                </a:tc>
-                <a:extLst>
-                  <a:ext uri="{0D108BD9-81ED-4DB2-BD59-A6C34878D82A}">
-                    <a16:rowId xmlns="" xmlns:a16="http://schemas.microsoft.com/office/drawing/2014/main" val="10001"/>
-                  </a:ext>
-                </a:extLst>
-              </a:tr>
-            </a:tbl>
-          </a:graphicData>
-        </a:graphic>
-      </p:graphicFrame>
-      <p:graphicFrame>
-        <p:nvGraphicFramePr>
-          <p:cNvPr id="9" name="표 8"/>
-          <p:cNvGraphicFramePr>
-            <a:graphicFrameLocks noGrp="1"/>
-          </p:cNvGraphicFramePr>
-          <p:nvPr>
-            <p:extLst>
-              <p:ext uri="{D42A27DB-BD31-4B8C-83A1-F6EECF244321}">
-                <p14:modId xmlns:p14="http://schemas.microsoft.com/office/powerpoint/2010/main" val="670172914"/>
-              </p:ext>
-            </p:extLst>
-          </p:nvPr>
-        </p:nvGraphicFramePr>
-        <p:xfrm>
-          <a:off x="131601" y="1283516"/>
-          <a:ext cx="7982669" cy="5347943"/>
-        </p:xfrm>
-        <a:graphic>
-          <a:graphicData uri="http://schemas.openxmlformats.org/drawingml/2006/table">
-            <a:tbl>
-              <a:tblPr firstRow="1" bandRow="1">
-                <a:tableStyleId>{5C22544A-7EE6-4342-B048-85BDC9FD1C3A}</a:tableStyleId>
-              </a:tblPr>
-              <a:tblGrid>
-                <a:gridCol w="7982669">
-                  <a:extLst>
-                    <a:ext uri="{9D8B030D-6E8A-4147-A177-3AD203B41FA5}">
-                      <a16:colId xmlns="" xmlns:a16="http://schemas.microsoft.com/office/drawing/2014/main" val="20000"/>
-                    </a:ext>
-                  </a:extLst>
-                </a:gridCol>
-              </a:tblGrid>
-              <a:tr h="5347943">
-                <a:tc>
-                  <a:txBody>
-                    <a:bodyPr/>
-                    <a:lstStyle/>
-                    <a:p>
-                      <a:pPr latinLnBrk="1"/>
-                      <a:endParaRPr lang="ko-KR" altLang="en-US" dirty="0"/>
-                    </a:p>
-                  </a:txBody>
-                  <a:tcPr>
-                    <a:lnL w="12700" cap="flat" cmpd="sng" algn="ctr">
-                      <a:solidFill>
-                        <a:schemeClr val="tx1"/>
-                      </a:solidFill>
-                      <a:prstDash val="solid"/>
-                      <a:round/>
-                      <a:headEnd type="none" w="med" len="med"/>
-                      <a:tailEnd type="none" w="med" len="med"/>
-                    </a:lnL>
-                    <a:lnR w="12700" cap="flat" cmpd="sng" algn="ctr">
-                      <a:solidFill>
-                        <a:schemeClr val="tx1"/>
-                      </a:solidFill>
-                      <a:prstDash val="solid"/>
-                      <a:round/>
-                      <a:headEnd type="none" w="med" len="med"/>
-                      <a:tailEnd type="none" w="med" len="med"/>
-                    </a:lnR>
-                    <a:lnT w="12700" cap="flat" cmpd="sng" algn="ctr">
-                      <a:solidFill>
-                        <a:schemeClr val="tx1"/>
-                      </a:solidFill>
-                      <a:prstDash val="solid"/>
-                      <a:round/>
-                      <a:headEnd type="none" w="med" len="med"/>
-                      <a:tailEnd type="none" w="med" len="med"/>
-                    </a:lnT>
-                    <a:lnB w="12700" cap="flat" cmpd="sng" algn="ctr">
-                      <a:solidFill>
-                        <a:schemeClr val="tx1"/>
-                      </a:solidFill>
-                      <a:prstDash val="solid"/>
-                      <a:round/>
-                      <a:headEnd type="none" w="med" len="med"/>
-                      <a:tailEnd type="none" w="med" len="med"/>
-                    </a:lnB>
-                    <a:lnTlToBr w="12700" cmpd="sng">
-                      <a:noFill/>
-                      <a:prstDash val="solid"/>
-                    </a:lnTlToBr>
-                    <a:lnBlToTr w="12700" cmpd="sng">
-                      <a:noFill/>
-                      <a:prstDash val="solid"/>
-                    </a:lnBlToTr>
-                    <a:solidFill>
-                      <a:schemeClr val="bg1"/>
-                    </a:solidFill>
-                  </a:tcPr>
-                </a:tc>
-                <a:extLst>
-                  <a:ext uri="{0D108BD9-81ED-4DB2-BD59-A6C34878D82A}">
-                    <a16:rowId xmlns="" xmlns:a16="http://schemas.microsoft.com/office/drawing/2014/main" val="10000"/>
-                  </a:ext>
-                </a:extLst>
-              </a:tr>
-            </a:tbl>
-          </a:graphicData>
-        </a:graphic>
-      </p:graphicFrame>
-      <p:pic>
-        <p:nvPicPr>
-          <p:cNvPr id="3" name="그림 2"/>
-          <p:cNvPicPr>
-            <a:picLocks noChangeAspect="1"/>
-          </p:cNvPicPr>
-          <p:nvPr/>
-        </p:nvPicPr>
-        <p:blipFill>
-          <a:blip r:embed="rId2"/>
-          <a:stretch>
-            <a:fillRect/>
-          </a:stretch>
-        </p:blipFill>
-        <p:spPr>
-          <a:xfrm>
-            <a:off x="3070144" y="1570573"/>
-            <a:ext cx="2155010" cy="4773827"/>
-          </a:xfrm>
-          <a:prstGeom prst="rect">
-            <a:avLst/>
-          </a:prstGeom>
-        </p:spPr>
-      </p:pic>
-      <p:graphicFrame>
-        <p:nvGraphicFramePr>
-          <p:cNvPr id="10" name="표 9"/>
-          <p:cNvGraphicFramePr>
-            <a:graphicFrameLocks noGrp="1"/>
-          </p:cNvGraphicFramePr>
-          <p:nvPr>
-            <p:extLst>
-              <p:ext uri="{D42A27DB-BD31-4B8C-83A1-F6EECF244321}">
-                <p14:modId xmlns:p14="http://schemas.microsoft.com/office/powerpoint/2010/main" val="2973487653"/>
-              </p:ext>
-            </p:extLst>
-          </p:nvPr>
-        </p:nvGraphicFramePr>
-        <p:xfrm>
-          <a:off x="8493211" y="1283516"/>
-          <a:ext cx="3491813" cy="848244"/>
-        </p:xfrm>
-        <a:graphic>
-          <a:graphicData uri="http://schemas.openxmlformats.org/drawingml/2006/table">
-            <a:tbl>
-              <a:tblPr firstRow="1" bandRow="1">
-                <a:noFill/>
-              </a:tblPr>
-              <a:tblGrid>
-                <a:gridCol w="3491813"/>
-              </a:tblGrid>
-              <a:tr h="413450">
-                <a:tc>
-                  <a:txBody>
-                    <a:bodyPr/>
-                    <a:lstStyle/>
-                    <a:p>
-                      <a:pPr marL="0" marR="0" lvl="0" indent="0" algn="ctr" rtl="0">
-                        <a:lnSpc>
-                          <a:spcPct val="100000"/>
-                        </a:lnSpc>
-                        <a:spcBef>
-                          <a:spcPts val="0"/>
-                        </a:spcBef>
-                        <a:spcAft>
-                          <a:spcPts val="0"/>
-                        </a:spcAft>
-                        <a:buClr>
-                          <a:srgbClr val="000000"/>
-                        </a:buClr>
-                        <a:buSzPts val="1500"/>
-                        <a:buFont typeface="Arial"/>
-                        <a:buNone/>
-                      </a:pPr>
-                      <a:r>
-                        <a:rPr lang="ko-KR" altLang="en-US" sz="1700" b="0" u="none" strike="noStrike" cap="none" dirty="0" smtClean="0">
-                          <a:solidFill>
-                            <a:schemeClr val="dk1"/>
-                          </a:solidFill>
-                        </a:rPr>
-                        <a:t>화면코드</a:t>
-                      </a:r>
-                      <a:endParaRPr sz="1700" b="0" u="none" strike="noStrike" cap="none" dirty="0">
-                        <a:solidFill>
-                          <a:schemeClr val="dk1"/>
-                        </a:solidFill>
-                      </a:endParaRPr>
-                    </a:p>
-                  </a:txBody>
-                  <a:tcPr marL="74304" marR="74304" marT="45725" marB="45725" anchor="ctr">
-                    <a:lnL w="12700" cap="flat" cmpd="sng">
-                      <a:solidFill>
-                        <a:schemeClr val="dk1"/>
-                      </a:solidFill>
-                      <a:prstDash val="solid"/>
-                      <a:round/>
-                      <a:headEnd type="none" w="sm" len="sm"/>
-                      <a:tailEnd type="none" w="sm" len="sm"/>
-                    </a:lnL>
-                    <a:lnR w="12700" cap="flat" cmpd="sng">
-                      <a:solidFill>
-                        <a:schemeClr val="dk1"/>
-                      </a:solidFill>
-                      <a:prstDash val="solid"/>
-                      <a:round/>
-                      <a:headEnd type="none" w="sm" len="sm"/>
-                      <a:tailEnd type="none" w="sm" len="sm"/>
-                    </a:lnR>
-                    <a:lnT w="12700" cap="flat" cmpd="sng">
-                      <a:solidFill>
-                        <a:schemeClr val="dk1"/>
-                      </a:solidFill>
-                      <a:prstDash val="solid"/>
-                      <a:round/>
-                      <a:headEnd type="none" w="sm" len="sm"/>
-                      <a:tailEnd type="none" w="sm" len="sm"/>
-                    </a:lnT>
-                    <a:lnB w="12700" cap="flat" cmpd="sng" algn="ctr">
-                      <a:solidFill>
-                        <a:schemeClr val="dk1"/>
-                      </a:solidFill>
-                      <a:prstDash val="solid"/>
-                      <a:round/>
-                      <a:headEnd type="none" w="sm" len="sm"/>
-                      <a:tailEnd type="none" w="sm" len="sm"/>
-                    </a:lnB>
-                    <a:solidFill>
-                      <a:srgbClr val="D8D8D8"/>
-                    </a:solidFill>
-                  </a:tcPr>
-                </a:tc>
-              </a:tr>
-              <a:tr h="434794">
-                <a:tc>
-                  <a:txBody>
-                    <a:bodyPr/>
-                    <a:lstStyle/>
-                    <a:p>
-                      <a:pPr marL="0" marR="0" lvl="0" indent="0" algn="ctr" defTabSz="914400" rtl="0" eaLnBrk="1" fontAlgn="auto" latinLnBrk="1" hangingPunct="1">
-                        <a:lnSpc>
-                          <a:spcPct val="100000"/>
-                        </a:lnSpc>
-                        <a:spcBef>
-                          <a:spcPts val="0"/>
-                        </a:spcBef>
-                        <a:spcAft>
-                          <a:spcPts val="0"/>
-                        </a:spcAft>
-                        <a:buClrTx/>
-                        <a:buSzTx/>
-                        <a:buFontTx/>
-                        <a:buNone/>
-                        <a:tabLst/>
-                        <a:defRPr sz="1000" b="0">
-                          <a:solidFill>
-                            <a:srgbClr val="000000"/>
-                          </a:solidFill>
-                          <a:latin typeface="Arial"/>
-                          <a:ea typeface="Arial"/>
-                          <a:cs typeface="Arial"/>
-                          <a:sym typeface="Arial"/>
-                        </a:defRPr>
-                      </a:pPr>
-                      <a:r>
-                        <a:rPr lang="en-US" altLang="ko-KR" sz="1800" b="0" u="none" strike="noStrike" cap="none" dirty="0" err="1" smtClean="0">
-                          <a:solidFill>
-                            <a:schemeClr val="dk1"/>
-                          </a:solidFill>
-                        </a:rPr>
-                        <a:t>sh_user_m_semiPay</a:t>
-                      </a:r>
-                      <a:endParaRPr lang="en-US" altLang="ko-KR" sz="1800" b="0" u="none" strike="noStrike" cap="none" dirty="0">
-                        <a:solidFill>
-                          <a:schemeClr val="dk1"/>
-                        </a:solidFill>
-                      </a:endParaRPr>
-                    </a:p>
-                  </a:txBody>
-                  <a:tcPr marL="74304" marR="74304" marT="45725" marB="45725" anchor="ctr">
-                    <a:lnL w="12700" cap="flat" cmpd="sng" algn="ctr">
-                      <a:solidFill>
-                        <a:schemeClr val="dk1"/>
-                      </a:solidFill>
-                      <a:prstDash val="solid"/>
-                      <a:round/>
-                      <a:headEnd type="none" w="sm" len="sm"/>
-                      <a:tailEnd type="none" w="sm" len="sm"/>
-                    </a:lnL>
-                    <a:lnR w="12700" cap="flat" cmpd="sng" algn="ctr">
-                      <a:solidFill>
-                        <a:schemeClr val="dk1"/>
-                      </a:solidFill>
-                      <a:prstDash val="solid"/>
-                      <a:round/>
-                      <a:headEnd type="none" w="sm" len="sm"/>
-                      <a:tailEnd type="none" w="sm" len="sm"/>
-                    </a:lnR>
-                    <a:lnT w="12700" cap="flat" cmpd="sng" algn="ctr">
-                      <a:solidFill>
-                        <a:schemeClr val="dk1"/>
-                      </a:solidFill>
-                      <a:prstDash val="solid"/>
-                      <a:round/>
-                      <a:headEnd type="none" w="sm" len="sm"/>
-                      <a:tailEnd type="none" w="sm" len="sm"/>
-                    </a:lnT>
-                    <a:lnB w="12700" cap="flat" cmpd="sng">
-                      <a:solidFill>
-                        <a:schemeClr val="dk1"/>
-                      </a:solidFill>
-                      <a:prstDash val="solid"/>
-                      <a:round/>
-                      <a:headEnd type="none" w="sm" len="sm"/>
-                      <a:tailEnd type="none" w="sm" len="sm"/>
-                    </a:lnB>
-                    <a:solidFill>
-                      <a:schemeClr val="bg1"/>
-                    </a:solidFill>
-                  </a:tcPr>
-                </a:tc>
-              </a:tr>
-            </a:tbl>
-          </a:graphicData>
-        </a:graphic>
-      </p:graphicFrame>
-      <p:sp>
-        <p:nvSpPr>
-          <p:cNvPr id="7" name="직사각형 6"/>
-          <p:cNvSpPr/>
-          <p:nvPr/>
-        </p:nvSpPr>
-        <p:spPr>
-          <a:xfrm>
-            <a:off x="114866" y="241014"/>
-            <a:ext cx="7720383" cy="477054"/>
-          </a:xfrm>
-          <a:prstGeom prst="rect">
-            <a:avLst/>
-          </a:prstGeom>
-        </p:spPr>
-        <p:txBody>
-          <a:bodyPr wrap="none">
-            <a:spAutoFit/>
-          </a:bodyPr>
-          <a:lstStyle/>
-          <a:p>
-            <a:pPr lvl="0">
-              <a:buClr>
-                <a:srgbClr val="000000"/>
-              </a:buClr>
-              <a:buSzPts val="1500"/>
-              <a:defRPr/>
-            </a:pPr>
-            <a:r>
-              <a:rPr lang="en-US" altLang="ko-KR" sz="2500" dirty="0" smtClean="0">
-                <a:solidFill>
-                  <a:schemeClr val="bg1"/>
-                </a:solidFill>
-                <a:latin typeface="+mj-lt"/>
-              </a:rPr>
-              <a:t>[</a:t>
-            </a:r>
-            <a:r>
-              <a:rPr lang="ko-KR" altLang="en-US" sz="2500" dirty="0" smtClean="0">
-                <a:solidFill>
-                  <a:schemeClr val="bg1"/>
-                </a:solidFill>
-                <a:latin typeface="+mj-lt"/>
-              </a:rPr>
-              <a:t>화면 설계</a:t>
-            </a:r>
-            <a:r>
-              <a:rPr lang="en-US" altLang="ko-KR" sz="2500" dirty="0" smtClean="0">
-                <a:solidFill>
-                  <a:schemeClr val="bg1"/>
-                </a:solidFill>
-                <a:latin typeface="+mj-lt"/>
-              </a:rPr>
-              <a:t>]</a:t>
-            </a:r>
-            <a:r>
-              <a:rPr lang="ko-KR" altLang="en-US" sz="2500" dirty="0" smtClean="0">
-                <a:solidFill>
-                  <a:schemeClr val="bg1"/>
-                </a:solidFill>
-                <a:latin typeface="+mj-lt"/>
-              </a:rPr>
-              <a:t>사용자</a:t>
-            </a:r>
-            <a:r>
-              <a:rPr lang="en-US" altLang="ko-KR" sz="2500" dirty="0">
-                <a:solidFill>
-                  <a:schemeClr val="bg1"/>
-                </a:solidFill>
-              </a:rPr>
-              <a:t> – </a:t>
-            </a:r>
-            <a:r>
-              <a:rPr lang="ko-KR" altLang="en-US" sz="2500" dirty="0" err="1">
-                <a:solidFill>
-                  <a:schemeClr val="bg1"/>
-                </a:solidFill>
-              </a:rPr>
-              <a:t>모바일</a:t>
-            </a:r>
-            <a:r>
-              <a:rPr lang="ko-KR" altLang="en-US" sz="2500" dirty="0">
-                <a:solidFill>
-                  <a:schemeClr val="bg1"/>
-                </a:solidFill>
-              </a:rPr>
-              <a:t> </a:t>
-            </a:r>
-            <a:r>
-              <a:rPr lang="en-US" altLang="ko-KR" sz="2500" dirty="0" smtClean="0">
-                <a:solidFill>
-                  <a:schemeClr val="bg1"/>
-                </a:solidFill>
-                <a:latin typeface="+mj-lt"/>
-              </a:rPr>
-              <a:t>– </a:t>
-            </a:r>
-            <a:r>
-              <a:rPr lang="ko-KR" altLang="en-US" sz="2500" dirty="0" smtClean="0">
-                <a:solidFill>
-                  <a:schemeClr val="bg1"/>
-                </a:solidFill>
-                <a:latin typeface="+mj-lt"/>
-              </a:rPr>
-              <a:t>세미나 결제 페이지</a:t>
-            </a:r>
-            <a:r>
-              <a:rPr lang="en-US" altLang="ko-KR" sz="2500" dirty="0" smtClean="0">
-                <a:solidFill>
-                  <a:schemeClr val="bg1"/>
-                </a:solidFill>
-                <a:latin typeface="+mj-lt"/>
-              </a:rPr>
-              <a:t>– 3</a:t>
-            </a:r>
-            <a:endParaRPr lang="ko-KR" altLang="en-US" sz="2500" dirty="0">
-              <a:solidFill>
-                <a:schemeClr val="bg1"/>
-              </a:solidFill>
-              <a:latin typeface="+mj-lt"/>
-            </a:endParaRPr>
-          </a:p>
-        </p:txBody>
-      </p:sp>
-    </p:spTree>
-    <p:extLst>
-      <p:ext uri="{BB962C8B-B14F-4D97-AF65-F5344CB8AC3E}">
-        <p14:creationId xmlns:p14="http://schemas.microsoft.com/office/powerpoint/2010/main" val="3773053286"/>
-      </p:ext>
-    </p:extLst>
-  </p:cSld>
-  <p:clrMapOvr>
-    <a:masterClrMapping/>
-  </p:clrMapOvr>
-  <p:timing>
-    <p:tnLst>
-      <p:par>
-        <p:cTn id="1" dur="indefinite" restart="never" nodeType="tmRoot"/>
-      </p:par>
-    </p:tnLst>
-  </p:timing>
-</p:sld>
-</file>
-
-<file path=ppt/slides/slide22.xml><?xml version="1.0" encoding="utf-8"?>
-<p:sld xmlns:a="http://schemas.openxmlformats.org/drawingml/2006/main" xmlns:r="http://schemas.openxmlformats.org/officeDocument/2006/relationships" xmlns:p="http://schemas.openxmlformats.org/presentationml/2006/main">
-  <p:cSld>
-    <p:spTree>
-      <p:nvGrpSpPr>
-        <p:cNvPr id="1" name=""/>
-        <p:cNvGrpSpPr/>
-        <p:nvPr/>
-      </p:nvGrpSpPr>
-      <p:grpSpPr>
-        <a:xfrm>
-          <a:off x="0" y="0"/>
-          <a:ext cx="0" cy="0"/>
-          <a:chOff x="0" y="0"/>
-          <a:chExt cx="0" cy="0"/>
-        </a:xfrm>
-      </p:grpSpPr>
-    </p:spTree>
-    <p:extLst>
-      <p:ext uri="{BB962C8B-B14F-4D97-AF65-F5344CB8AC3E}">
-        <p14:creationId xmlns:p14="http://schemas.microsoft.com/office/powerpoint/2010/main" val="2360628577"/>
-      </p:ext>
-    </p:extLst>
-  </p:cSld>
-  <p:clrMapOvr>
-    <a:masterClrMapping/>
-  </p:clrMapOvr>
 </p:sld>
 </file>
 
@@ -17094,7 +14369,7 @@
                 <a:gridCol w="8032096">
                   <a:extLst>
                     <a:ext uri="{9D8B030D-6E8A-4147-A177-3AD203B41FA5}">
-                      <a16:colId xmlns:a16="http://schemas.microsoft.com/office/drawing/2014/main" xmlns="" val="20000"/>
+                      <a16:colId xmlns="" xmlns:a16="http://schemas.microsoft.com/office/drawing/2014/main" val="20000"/>
                     </a:ext>
                   </a:extLst>
                 </a:gridCol>
@@ -17159,7 +14434,7 @@
                 </a:tc>
                 <a:extLst>
                   <a:ext uri="{0D108BD9-81ED-4DB2-BD59-A6C34878D82A}">
-                    <a16:rowId xmlns:a16="http://schemas.microsoft.com/office/drawing/2014/main" xmlns="" val="10000"/>
+                    <a16:rowId xmlns="" xmlns:a16="http://schemas.microsoft.com/office/drawing/2014/main" val="10000"/>
                   </a:ext>
                 </a:extLst>
               </a:tr>
@@ -17223,7 +14498,7 @@
                 </a:tc>
                 <a:extLst>
                   <a:ext uri="{0D108BD9-81ED-4DB2-BD59-A6C34878D82A}">
-                    <a16:rowId xmlns:a16="http://schemas.microsoft.com/office/drawing/2014/main" xmlns="" val="10001"/>
+                    <a16:rowId xmlns="" xmlns:a16="http://schemas.microsoft.com/office/drawing/2014/main" val="10001"/>
                   </a:ext>
                 </a:extLst>
               </a:tr>
@@ -17770,14 +15045,14 @@
                 <a:gridCol w="342705">
                   <a:extLst>
                     <a:ext uri="{9D8B030D-6E8A-4147-A177-3AD203B41FA5}">
-                      <a16:colId xmlns:a16="http://schemas.microsoft.com/office/drawing/2014/main" xmlns="" val="20000"/>
+                      <a16:colId xmlns="" xmlns:a16="http://schemas.microsoft.com/office/drawing/2014/main" val="20000"/>
                     </a:ext>
                   </a:extLst>
                 </a:gridCol>
                 <a:gridCol w="3149108">
                   <a:extLst>
                     <a:ext uri="{9D8B030D-6E8A-4147-A177-3AD203B41FA5}">
-                      <a16:colId xmlns:a16="http://schemas.microsoft.com/office/drawing/2014/main" xmlns="" val="20001"/>
+                      <a16:colId xmlns="" xmlns:a16="http://schemas.microsoft.com/office/drawing/2014/main" val="20001"/>
                     </a:ext>
                   </a:extLst>
                 </a:gridCol>
@@ -17874,7 +15149,7 @@
                 </a:tc>
                 <a:extLst>
                   <a:ext uri="{0D108BD9-81ED-4DB2-BD59-A6C34878D82A}">
-                    <a16:rowId xmlns:a16="http://schemas.microsoft.com/office/drawing/2014/main" xmlns="" val="10000"/>
+                    <a16:rowId xmlns="" xmlns:a16="http://schemas.microsoft.com/office/drawing/2014/main" val="10000"/>
                   </a:ext>
                 </a:extLst>
               </a:tr>
@@ -17998,7 +15273,7 @@
                 </a:tc>
                 <a:extLst>
                   <a:ext uri="{0D108BD9-81ED-4DB2-BD59-A6C34878D82A}">
-                    <a16:rowId xmlns:a16="http://schemas.microsoft.com/office/drawing/2014/main" xmlns="" val="10001"/>
+                    <a16:rowId xmlns="" xmlns:a16="http://schemas.microsoft.com/office/drawing/2014/main" val="10001"/>
                   </a:ext>
                 </a:extLst>
               </a:tr>
@@ -18484,7 +15759,7 @@
                 <a:gridCol w="8032096">
                   <a:extLst>
                     <a:ext uri="{9D8B030D-6E8A-4147-A177-3AD203B41FA5}">
-                      <a16:colId xmlns:a16="http://schemas.microsoft.com/office/drawing/2014/main" xmlns="" val="20000"/>
+                      <a16:colId xmlns="" xmlns:a16="http://schemas.microsoft.com/office/drawing/2014/main" val="20000"/>
                     </a:ext>
                   </a:extLst>
                 </a:gridCol>
@@ -18549,7 +15824,7 @@
                 </a:tc>
                 <a:extLst>
                   <a:ext uri="{0D108BD9-81ED-4DB2-BD59-A6C34878D82A}">
-                    <a16:rowId xmlns:a16="http://schemas.microsoft.com/office/drawing/2014/main" xmlns="" val="10000"/>
+                    <a16:rowId xmlns="" xmlns:a16="http://schemas.microsoft.com/office/drawing/2014/main" val="10000"/>
                   </a:ext>
                 </a:extLst>
               </a:tr>
@@ -18613,7 +15888,7 @@
                 </a:tc>
                 <a:extLst>
                   <a:ext uri="{0D108BD9-81ED-4DB2-BD59-A6C34878D82A}">
-                    <a16:rowId xmlns:a16="http://schemas.microsoft.com/office/drawing/2014/main" xmlns="" val="10001"/>
+                    <a16:rowId xmlns="" xmlns:a16="http://schemas.microsoft.com/office/drawing/2014/main" val="10001"/>
                   </a:ext>
                 </a:extLst>
               </a:tr>
@@ -19160,14 +16435,14 @@
                 <a:gridCol w="342705">
                   <a:extLst>
                     <a:ext uri="{9D8B030D-6E8A-4147-A177-3AD203B41FA5}">
-                      <a16:colId xmlns:a16="http://schemas.microsoft.com/office/drawing/2014/main" xmlns="" val="20000"/>
+                      <a16:colId xmlns="" xmlns:a16="http://schemas.microsoft.com/office/drawing/2014/main" val="20000"/>
                     </a:ext>
                   </a:extLst>
                 </a:gridCol>
                 <a:gridCol w="3149108">
                   <a:extLst>
                     <a:ext uri="{9D8B030D-6E8A-4147-A177-3AD203B41FA5}">
-                      <a16:colId xmlns:a16="http://schemas.microsoft.com/office/drawing/2014/main" xmlns="" val="20001"/>
+                      <a16:colId xmlns="" xmlns:a16="http://schemas.microsoft.com/office/drawing/2014/main" val="20001"/>
                     </a:ext>
                   </a:extLst>
                 </a:gridCol>
@@ -19264,7 +16539,7 @@
                 </a:tc>
                 <a:extLst>
                   <a:ext uri="{0D108BD9-81ED-4DB2-BD59-A6C34878D82A}">
-                    <a16:rowId xmlns:a16="http://schemas.microsoft.com/office/drawing/2014/main" xmlns="" val="10000"/>
+                    <a16:rowId xmlns="" xmlns:a16="http://schemas.microsoft.com/office/drawing/2014/main" val="10000"/>
                   </a:ext>
                 </a:extLst>
               </a:tr>
@@ -19394,7 +16669,7 @@
                 </a:tc>
                 <a:extLst>
                   <a:ext uri="{0D108BD9-81ED-4DB2-BD59-A6C34878D82A}">
-                    <a16:rowId xmlns:a16="http://schemas.microsoft.com/office/drawing/2014/main" xmlns="" val="10001"/>
+                    <a16:rowId xmlns="" xmlns:a16="http://schemas.microsoft.com/office/drawing/2014/main" val="10001"/>
                   </a:ext>
                 </a:extLst>
               </a:tr>
@@ -19512,7 +16787,7 @@
                 <a:gridCol w="8032096">
                   <a:extLst>
                     <a:ext uri="{9D8B030D-6E8A-4147-A177-3AD203B41FA5}">
-                      <a16:colId xmlns:a16="http://schemas.microsoft.com/office/drawing/2014/main" xmlns="" val="20000"/>
+                      <a16:colId xmlns="" xmlns:a16="http://schemas.microsoft.com/office/drawing/2014/main" val="20000"/>
                     </a:ext>
                   </a:extLst>
                 </a:gridCol>
@@ -19581,7 +16856,7 @@
                 </a:tc>
                 <a:extLst>
                   <a:ext uri="{0D108BD9-81ED-4DB2-BD59-A6C34878D82A}">
-                    <a16:rowId xmlns:a16="http://schemas.microsoft.com/office/drawing/2014/main" xmlns="" val="10000"/>
+                    <a16:rowId xmlns="" xmlns:a16="http://schemas.microsoft.com/office/drawing/2014/main" val="10000"/>
                   </a:ext>
                 </a:extLst>
               </a:tr>
@@ -20405,14 +17680,14 @@
                 <a:gridCol w="342705">
                   <a:extLst>
                     <a:ext uri="{9D8B030D-6E8A-4147-A177-3AD203B41FA5}">
-                      <a16:colId xmlns="" xmlns:a16="http://schemas.microsoft.com/office/drawing/2014/main" val="20000"/>
+                      <a16:colId xmlns:a16="http://schemas.microsoft.com/office/drawing/2014/main" xmlns="" val="20000"/>
                     </a:ext>
                   </a:extLst>
                 </a:gridCol>
                 <a:gridCol w="3149108">
                   <a:extLst>
                     <a:ext uri="{9D8B030D-6E8A-4147-A177-3AD203B41FA5}">
-                      <a16:colId xmlns="" xmlns:a16="http://schemas.microsoft.com/office/drawing/2014/main" val="20001"/>
+                      <a16:colId xmlns:a16="http://schemas.microsoft.com/office/drawing/2014/main" xmlns="" val="20001"/>
                     </a:ext>
                   </a:extLst>
                 </a:gridCol>
@@ -20508,7 +17783,7 @@
                 </a:tc>
                 <a:extLst>
                   <a:ext uri="{0D108BD9-81ED-4DB2-BD59-A6C34878D82A}">
-                    <a16:rowId xmlns="" xmlns:a16="http://schemas.microsoft.com/office/drawing/2014/main" val="10000"/>
+                    <a16:rowId xmlns:a16="http://schemas.microsoft.com/office/drawing/2014/main" xmlns="" val="10000"/>
                   </a:ext>
                 </a:extLst>
               </a:tr>
@@ -20640,7 +17915,7 @@
                 </a:tc>
                 <a:extLst>
                   <a:ext uri="{0D108BD9-81ED-4DB2-BD59-A6C34878D82A}">
-                    <a16:rowId xmlns="" xmlns:a16="http://schemas.microsoft.com/office/drawing/2014/main" val="10001"/>
+                    <a16:rowId xmlns:a16="http://schemas.microsoft.com/office/drawing/2014/main" xmlns="" val="10001"/>
                   </a:ext>
                 </a:extLst>
               </a:tr>
@@ -20676,7 +17951,7 @@
                 <a:gridCol w="8032096">
                   <a:extLst>
                     <a:ext uri="{9D8B030D-6E8A-4147-A177-3AD203B41FA5}">
-                      <a16:colId xmlns="" xmlns:a16="http://schemas.microsoft.com/office/drawing/2014/main" val="20000"/>
+                      <a16:colId xmlns:a16="http://schemas.microsoft.com/office/drawing/2014/main" xmlns="" val="20000"/>
                     </a:ext>
                   </a:extLst>
                 </a:gridCol>
@@ -20741,7 +18016,7 @@
                 </a:tc>
                 <a:extLst>
                   <a:ext uri="{0D108BD9-81ED-4DB2-BD59-A6C34878D82A}">
-                    <a16:rowId xmlns="" xmlns:a16="http://schemas.microsoft.com/office/drawing/2014/main" val="10000"/>
+                    <a16:rowId xmlns:a16="http://schemas.microsoft.com/office/drawing/2014/main" xmlns="" val="10000"/>
                   </a:ext>
                 </a:extLst>
               </a:tr>
@@ -20805,7 +18080,7 @@
                 </a:tc>
                 <a:extLst>
                   <a:ext uri="{0D108BD9-81ED-4DB2-BD59-A6C34878D82A}">
-                    <a16:rowId xmlns="" xmlns:a16="http://schemas.microsoft.com/office/drawing/2014/main" val="10001"/>
+                    <a16:rowId xmlns:a16="http://schemas.microsoft.com/office/drawing/2014/main" xmlns="" val="10001"/>
                   </a:ext>
                 </a:extLst>
               </a:tr>
@@ -22331,7 +19606,7 @@
   <a:extraClrSchemeLst/>
   <a:extLst>
     <a:ext uri="{05A4C25C-085E-4340-85A3-A5531E510DB2}">
-      <thm15:themeFamily xmlns="" xmlns:thm15="http://schemas.microsoft.com/office/thememl/2012/main" name="Office Theme" id="{62F939B6-93AF-4DB8-9C6B-D6C7DFDC589F}" vid="{4A3C46E8-61CC-4603-A589-7422A47A8E4A}"/>
+      <thm15:themeFamily xmlns:thm15="http://schemas.microsoft.com/office/thememl/2012/main" xmlns="" name="Office Theme" id="{62F939B6-93AF-4DB8-9C6B-D6C7DFDC589F}" vid="{4A3C46E8-61CC-4603-A589-7422A47A8E4A}"/>
     </a:ext>
   </a:extLst>
 </a:theme>
@@ -22592,7 +19867,7 @@
   <a:extraClrSchemeLst/>
   <a:extLst>
     <a:ext uri="{05A4C25C-085E-4340-85A3-A5531E510DB2}">
-      <thm15:themeFamily xmlns="" xmlns:thm15="http://schemas.microsoft.com/office/thememl/2012/main" name="Office Theme" id="{62F939B6-93AF-4DB8-9C6B-D6C7DFDC589F}" vid="{4A3C46E8-61CC-4603-A589-7422A47A8E4A}"/>
+      <thm15:themeFamily xmlns:thm15="http://schemas.microsoft.com/office/thememl/2012/main" xmlns="" name="Office Theme" id="{62F939B6-93AF-4DB8-9C6B-D6C7DFDC589F}" vid="{4A3C46E8-61CC-4603-A589-7422A47A8E4A}"/>
     </a:ext>
   </a:extLst>
 </a:theme>

</xml_diff>